<commit_message>
Update Delegate & Closure
To clarify the idea
</commit_message>
<xml_diff>
--- a/筆記/iOS 筆記_02 傳遞資料 Delegation-Closure 17-0309.pptx
+++ b/筆記/iOS 筆記_02 傳遞資料 Delegation-Closure 17-0309.pptx
@@ -5,7 +5,7 @@
     <p:sldMasterId id="2147483648" r:id="rId1"/>
   </p:sldMasterIdLst>
   <p:notesMasterIdLst>
-    <p:notesMasterId r:id="rId35"/>
+    <p:notesMasterId r:id="rId39"/>
   </p:notesMasterIdLst>
   <p:sldIdLst>
     <p:sldId id="256" r:id="rId2"/>
@@ -18,29 +18,33 @@
     <p:sldId id="300" r:id="rId9"/>
     <p:sldId id="301" r:id="rId10"/>
     <p:sldId id="302" r:id="rId11"/>
-    <p:sldId id="264" r:id="rId12"/>
-    <p:sldId id="284" r:id="rId13"/>
-    <p:sldId id="263" r:id="rId14"/>
-    <p:sldId id="334" r:id="rId15"/>
-    <p:sldId id="340" r:id="rId16"/>
-    <p:sldId id="303" r:id="rId17"/>
-    <p:sldId id="308" r:id="rId18"/>
-    <p:sldId id="306" r:id="rId19"/>
-    <p:sldId id="304" r:id="rId20"/>
-    <p:sldId id="309" r:id="rId21"/>
-    <p:sldId id="310" r:id="rId22"/>
-    <p:sldId id="330" r:id="rId23"/>
-    <p:sldId id="331" r:id="rId24"/>
-    <p:sldId id="332" r:id="rId25"/>
-    <p:sldId id="333" r:id="rId26"/>
-    <p:sldId id="305" r:id="rId27"/>
-    <p:sldId id="339" r:id="rId28"/>
-    <p:sldId id="336" r:id="rId29"/>
-    <p:sldId id="335" r:id="rId30"/>
-    <p:sldId id="337" r:id="rId31"/>
-    <p:sldId id="338" r:id="rId32"/>
-    <p:sldId id="307" r:id="rId33"/>
-    <p:sldId id="294" r:id="rId34"/>
+    <p:sldId id="341" r:id="rId12"/>
+    <p:sldId id="264" r:id="rId13"/>
+    <p:sldId id="284" r:id="rId14"/>
+    <p:sldId id="263" r:id="rId15"/>
+    <p:sldId id="334" r:id="rId16"/>
+    <p:sldId id="340" r:id="rId17"/>
+    <p:sldId id="303" r:id="rId18"/>
+    <p:sldId id="308" r:id="rId19"/>
+    <p:sldId id="306" r:id="rId20"/>
+    <p:sldId id="304" r:id="rId21"/>
+    <p:sldId id="309" r:id="rId22"/>
+    <p:sldId id="310" r:id="rId23"/>
+    <p:sldId id="330" r:id="rId24"/>
+    <p:sldId id="331" r:id="rId25"/>
+    <p:sldId id="332" r:id="rId26"/>
+    <p:sldId id="333" r:id="rId27"/>
+    <p:sldId id="343" r:id="rId28"/>
+    <p:sldId id="345" r:id="rId29"/>
+    <p:sldId id="342" r:id="rId30"/>
+    <p:sldId id="305" r:id="rId31"/>
+    <p:sldId id="339" r:id="rId32"/>
+    <p:sldId id="336" r:id="rId33"/>
+    <p:sldId id="335" r:id="rId34"/>
+    <p:sldId id="337" r:id="rId35"/>
+    <p:sldId id="338" r:id="rId36"/>
+    <p:sldId id="307" r:id="rId37"/>
+    <p:sldId id="294" r:id="rId38"/>
   </p:sldIdLst>
   <p:sldSz cx="9144000" cy="6858000" type="screen4x3"/>
   <p:notesSz cx="6858000" cy="9144000"/>
@@ -141,7 +145,7 @@
   </p:defaultTextStyle>
   <p:extLst>
     <p:ext uri="{EFAFB233-063F-42B5-8137-9DF3F51BA10A}">
-      <p15:sldGuideLst xmlns:p15="http://schemas.microsoft.com/office/powerpoint/2012/main" xmlns="">
+      <p15:sldGuideLst xmlns="" xmlns:p15="http://schemas.microsoft.com/office/powerpoint/2012/main">
         <p15:guide id="1" orient="horz" pos="2160">
           <p15:clr>
             <a:srgbClr val="A4A3A4"/>
@@ -240,7 +244,7 @@
           <a:p>
             <a:fld id="{5B01DFFE-E8EE-284C-B7F9-C4120111A53F}" type="datetimeFigureOut">
               <a:rPr kumimoji="1" lang="zh-TW" altLang="en-US" smtClean="0"/>
-              <a:t>17/3/25</a:t>
+              <a:t>17/3/31</a:t>
             </a:fld>
             <a:endParaRPr kumimoji="1" lang="zh-TW" altLang="en-US"/>
           </a:p>
@@ -689,7 +693,7 @@
           <a:p>
             <a:fld id="{4FD7B7E8-E084-854E-B5A8-6B82748C85D9}" type="datetimeFigureOut">
               <a:rPr kumimoji="1" lang="zh-TW" altLang="en-US" smtClean="0"/>
-              <a:t>17/3/25</a:t>
+              <a:t>17/3/31</a:t>
             </a:fld>
             <a:endParaRPr kumimoji="1" lang="zh-TW" altLang="en-US"/>
           </a:p>
@@ -842,7 +846,7 @@
           <a:p>
             <a:fld id="{4FD7B7E8-E084-854E-B5A8-6B82748C85D9}" type="datetimeFigureOut">
               <a:rPr kumimoji="1" lang="zh-TW" altLang="en-US" smtClean="0"/>
-              <a:t>17/3/25</a:t>
+              <a:t>17/3/31</a:t>
             </a:fld>
             <a:endParaRPr kumimoji="1" lang="zh-TW" altLang="en-US"/>
           </a:p>
@@ -1033,7 +1037,7 @@
           <a:p>
             <a:fld id="{4FD7B7E8-E084-854E-B5A8-6B82748C85D9}" type="datetimeFigureOut">
               <a:rPr kumimoji="1" lang="zh-TW" altLang="en-US" smtClean="0"/>
-              <a:t>17/3/25</a:t>
+              <a:t>17/3/31</a:t>
             </a:fld>
             <a:endParaRPr kumimoji="1" lang="zh-TW" altLang="en-US"/>
           </a:p>
@@ -2548,6 +2552,683 @@
           <a:lstStyle/>
           <a:p>
             <a:r>
+              <a:rPr kumimoji="1" lang="en-US" altLang="zh-TW" dirty="0" smtClean="0"/>
+              <a:t>Delegate </a:t>
+            </a:r>
+            <a:r>
+              <a:rPr kumimoji="1" lang="zh-TW" altLang="en-US" dirty="0" smtClean="0"/>
+              <a:t>觀念</a:t>
+            </a:r>
+            <a:endParaRPr kumimoji="1" lang="zh-TW" altLang="en-US" dirty="0"/>
+          </a:p>
+        </p:txBody>
+      </p:sp>
+      <p:sp>
+        <p:nvSpPr>
+          <p:cNvPr id="3" name="內容版面配置區 2"/>
+          <p:cNvSpPr>
+            <a:spLocks noGrp="1"/>
+          </p:cNvSpPr>
+          <p:nvPr>
+            <p:ph idx="1"/>
+          </p:nvPr>
+        </p:nvSpPr>
+        <p:spPr>
+          <a:xfrm>
+            <a:off x="170636" y="742129"/>
+            <a:ext cx="8693313" cy="6042758"/>
+          </a:xfrm>
+        </p:spPr>
+        <p:txBody>
+          <a:bodyPr>
+            <a:normAutofit fontScale="92500"/>
+          </a:bodyPr>
+          <a:lstStyle/>
+          <a:p>
+            <a:r>
+              <a:rPr kumimoji="1" lang="en-US" altLang="zh-TW" sz="2000" dirty="0" smtClean="0"/>
+              <a:t>Swift </a:t>
+            </a:r>
+            <a:r>
+              <a:rPr kumimoji="1" lang="zh-TW" altLang="en-US" sz="2000" dirty="0" smtClean="0"/>
+              <a:t>內定</a:t>
+            </a:r>
+            <a:r>
+              <a:rPr kumimoji="1" lang="zh-TW" altLang="en-US" sz="2000" dirty="0" smtClean="0"/>
+              <a:t>地圖</a:t>
+            </a:r>
+            <a:r>
+              <a:rPr kumimoji="1" lang="zh-TW" altLang="en-US" sz="2000" dirty="0" smtClean="0"/>
+              <a:t>功能叫</a:t>
+            </a:r>
+            <a:r>
+              <a:rPr kumimoji="1" lang="en-US" altLang="zh-TW" sz="2000" dirty="0" smtClean="0"/>
+              <a:t> </a:t>
+            </a:r>
+            <a:r>
+              <a:rPr kumimoji="1" lang="en-US" altLang="zh-TW" sz="2000" dirty="0" err="1" smtClean="0"/>
+              <a:t>CLLocatioManager</a:t>
+            </a:r>
+            <a:r>
+              <a:rPr kumimoji="1" lang="en-US" altLang="zh-TW" sz="2000" dirty="0"/>
+              <a:t> </a:t>
+            </a:r>
+            <a:r>
+              <a:rPr kumimoji="1" lang="zh-TW" altLang="en-US" sz="2000" dirty="0" smtClean="0"/>
+              <a:t>是實際處理地圖資訊的</a:t>
+            </a:r>
+            <a:r>
+              <a:rPr kumimoji="1" lang="en-US" altLang="zh-TW" sz="2000" dirty="0" smtClean="0"/>
+              <a:t> Class</a:t>
+            </a:r>
+            <a:endParaRPr kumimoji="1" lang="en-US" altLang="zh-TW" sz="2000" dirty="0" smtClean="0"/>
+          </a:p>
+          <a:p>
+            <a:r>
+              <a:rPr kumimoji="1" lang="zh-TW" altLang="en-US" sz="2000" dirty="0" smtClean="0"/>
+              <a:t>我在本地寫程式碼做地圖功能</a:t>
+            </a:r>
+            <a:r>
+              <a:rPr kumimoji="1" lang="en-US" altLang="zh-TW" sz="2000" dirty="0" smtClean="0"/>
+              <a:t>, </a:t>
+            </a:r>
+            <a:r>
+              <a:rPr kumimoji="1" lang="zh-TW" altLang="en-US" sz="2000" dirty="0" smtClean="0"/>
+              <a:t>如果要重寫所有取得定位的功能</a:t>
+            </a:r>
+            <a:r>
+              <a:rPr kumimoji="1" lang="en-US" altLang="zh-TW" sz="2000" dirty="0" smtClean="0"/>
+              <a:t>, </a:t>
+            </a:r>
+            <a:r>
+              <a:rPr kumimoji="1" lang="zh-TW" altLang="en-US" sz="2000" dirty="0" smtClean="0"/>
+              <a:t>太困難</a:t>
+            </a:r>
+            <a:r>
+              <a:rPr kumimoji="1" lang="en-US" altLang="zh-TW" sz="2000" dirty="0" smtClean="0"/>
+              <a:t>, </a:t>
+            </a:r>
+            <a:r>
+              <a:rPr kumimoji="1" lang="zh-TW" altLang="en-US" sz="2000" dirty="0" smtClean="0"/>
+              <a:t>或者不開放</a:t>
+            </a:r>
+            <a:r>
+              <a:rPr kumimoji="1" lang="en-US" altLang="zh-TW" sz="2000" dirty="0" smtClean="0"/>
+              <a:t>, </a:t>
+            </a:r>
+            <a:r>
+              <a:rPr kumimoji="1" lang="zh-TW" altLang="en-US" sz="2000" dirty="0" smtClean="0"/>
+              <a:t>不如使用寫好在</a:t>
+            </a:r>
+            <a:r>
+              <a:rPr kumimoji="1" lang="en-US" altLang="zh-TW" sz="2000" dirty="0" smtClean="0"/>
+              <a:t> </a:t>
+            </a:r>
+            <a:r>
+              <a:rPr kumimoji="1" lang="en-US" altLang="zh-TW" sz="2000" dirty="0" err="1" smtClean="0"/>
+              <a:t>CLLocationManager</a:t>
+            </a:r>
+            <a:r>
+              <a:rPr kumimoji="1" lang="en-US" altLang="zh-TW" sz="2000" dirty="0" smtClean="0"/>
+              <a:t> </a:t>
+            </a:r>
+            <a:r>
+              <a:rPr kumimoji="1" lang="zh-TW" altLang="en-US" sz="2000" dirty="0" smtClean="0"/>
+              <a:t>裡的套件</a:t>
+            </a:r>
+            <a:r>
+              <a:rPr kumimoji="1" lang="en-US" altLang="zh-TW" sz="2000" dirty="0" smtClean="0"/>
+              <a:t>, </a:t>
+            </a:r>
+            <a:r>
+              <a:rPr kumimoji="1" lang="zh-TW" altLang="en-US" sz="2000" dirty="0" smtClean="0"/>
+              <a:t>方法是宣告一個</a:t>
+            </a:r>
+            <a:r>
+              <a:rPr kumimoji="1" lang="en-US" altLang="zh-TW" sz="2000" dirty="0" smtClean="0"/>
+              <a:t>  </a:t>
+            </a:r>
+            <a:r>
+              <a:rPr kumimoji="1" lang="en-US" altLang="zh-TW" sz="2000" dirty="0" err="1" smtClean="0"/>
+              <a:t>CLLocationManager</a:t>
+            </a:r>
+            <a:r>
+              <a:rPr kumimoji="1" lang="en-US" altLang="zh-TW" sz="2000" dirty="0" smtClean="0"/>
+              <a:t> </a:t>
+            </a:r>
+            <a:r>
+              <a:rPr kumimoji="1" lang="zh-TW" altLang="en-US" sz="2000" dirty="0" smtClean="0"/>
+              <a:t>在本地的職務代理人</a:t>
+            </a:r>
+            <a:r>
+              <a:rPr kumimoji="1" lang="en-US" altLang="zh-TW" sz="2000" dirty="0" smtClean="0"/>
+              <a:t>(delegate), </a:t>
+            </a:r>
+            <a:r>
+              <a:rPr kumimoji="1" lang="zh-TW" altLang="en-US" sz="2000" dirty="0" smtClean="0"/>
+              <a:t>透過他</a:t>
+            </a:r>
+            <a:r>
+              <a:rPr kumimoji="1" lang="en-US" altLang="zh-TW" sz="2000" dirty="0" smtClean="0"/>
+              <a:t>, </a:t>
+            </a:r>
+            <a:r>
+              <a:rPr kumimoji="1" lang="zh-TW" altLang="en-US" sz="2000" dirty="0" smtClean="0"/>
+              <a:t>神功上身</a:t>
+            </a:r>
+            <a:r>
+              <a:rPr kumimoji="1" lang="en-US" altLang="zh-TW" sz="2000" dirty="0" smtClean="0"/>
+              <a:t>.</a:t>
+            </a:r>
+          </a:p>
+          <a:p>
+            <a:r>
+              <a:rPr kumimoji="1" lang="zh-TW" altLang="en-US" sz="2000" dirty="0" smtClean="0"/>
+              <a:t>在這個例子</a:t>
+            </a:r>
+            <a:r>
+              <a:rPr kumimoji="1" lang="en-US" altLang="zh-TW" sz="2000" dirty="0" smtClean="0"/>
+              <a:t> </a:t>
+            </a:r>
+            <a:r>
+              <a:rPr kumimoji="1" lang="en-US" altLang="zh-TW" sz="2000" dirty="0" err="1" smtClean="0"/>
+              <a:t>UIViewController</a:t>
+            </a:r>
+            <a:r>
+              <a:rPr kumimoji="1" lang="en-US" altLang="zh-TW" sz="2000" dirty="0" smtClean="0"/>
+              <a:t> </a:t>
+            </a:r>
+            <a:r>
+              <a:rPr kumimoji="1" lang="zh-TW" altLang="en-US" sz="2000" dirty="0" smtClean="0"/>
+              <a:t>被宣告為</a:t>
+            </a:r>
+            <a:r>
+              <a:rPr kumimoji="1" lang="en-US" altLang="zh-TW" sz="2000" dirty="0" smtClean="0"/>
+              <a:t> </a:t>
+            </a:r>
+            <a:r>
+              <a:rPr kumimoji="1" lang="en-US" altLang="zh-TW" sz="2000" dirty="0" err="1" smtClean="0"/>
+              <a:t>CLLocationManager</a:t>
+            </a:r>
+            <a:r>
+              <a:rPr kumimoji="1" lang="en-US" altLang="zh-TW" sz="2000" dirty="0" smtClean="0"/>
+              <a:t> </a:t>
+            </a:r>
+            <a:r>
+              <a:rPr kumimoji="1" lang="zh-TW" altLang="en-US" sz="2000" dirty="0" smtClean="0"/>
+              <a:t>的本地</a:t>
+            </a:r>
+            <a:r>
+              <a:rPr kumimoji="1" lang="en-US" altLang="zh-TW" sz="2000" dirty="0" smtClean="0"/>
+              <a:t> Delegate Class, </a:t>
+            </a:r>
+            <a:r>
+              <a:rPr kumimoji="1" lang="zh-TW" altLang="en-US" sz="2000" dirty="0" smtClean="0"/>
+              <a:t>是接收處理結果的物件</a:t>
+            </a:r>
+            <a:r>
+              <a:rPr kumimoji="1" lang="en-US" altLang="zh-TW" sz="2000" dirty="0" smtClean="0"/>
+              <a:t>. </a:t>
+            </a:r>
+            <a:r>
+              <a:rPr kumimoji="1" lang="zh-TW" altLang="en-US" sz="2000" dirty="0" smtClean="0"/>
+              <a:t>需要首先做到以下設定</a:t>
+            </a:r>
+            <a:r>
+              <a:rPr kumimoji="1" lang="en-US" altLang="zh-TW" sz="2000" dirty="0" smtClean="0"/>
+              <a:t>:</a:t>
+            </a:r>
+          </a:p>
+          <a:p>
+            <a:pPr lvl="1"/>
+            <a:r>
+              <a:rPr kumimoji="1" lang="zh-TW" altLang="en-US" sz="2000" dirty="0" smtClean="0"/>
+              <a:t>宣告本地</a:t>
+            </a:r>
+            <a:r>
+              <a:rPr kumimoji="1" lang="zh-TW" altLang="en-US" sz="2000" dirty="0"/>
+              <a:t>代理人</a:t>
+            </a:r>
+            <a:r>
+              <a:rPr kumimoji="1" lang="zh-TW" altLang="en-US" sz="2000" dirty="0" smtClean="0"/>
+              <a:t>要遵循同樣的語言</a:t>
+            </a:r>
+            <a:r>
+              <a:rPr kumimoji="1" lang="en-US" altLang="zh-TW" sz="2000" dirty="0" smtClean="0"/>
+              <a:t>(</a:t>
+            </a:r>
+            <a:r>
+              <a:rPr kumimoji="1" lang="en-US" altLang="zh-TW" sz="2000" dirty="0" err="1" smtClean="0"/>
+              <a:t>CLLocationManagerProtocol</a:t>
+            </a:r>
+            <a:r>
+              <a:rPr kumimoji="1" lang="en-US" altLang="zh-TW" sz="2000" dirty="0" smtClean="0"/>
+              <a:t>), </a:t>
+            </a:r>
+            <a:r>
+              <a:rPr kumimoji="1" lang="zh-TW" altLang="en-US" sz="2000" dirty="0" smtClean="0"/>
+              <a:t>可以理解為繼承關係</a:t>
+            </a:r>
+            <a:r>
+              <a:rPr kumimoji="1" lang="en-US" altLang="zh-TW" sz="2000" dirty="0" smtClean="0"/>
+              <a:t>.</a:t>
+            </a:r>
+          </a:p>
+          <a:p>
+            <a:pPr lvl="1"/>
+            <a:r>
+              <a:rPr kumimoji="1" lang="zh-TW" altLang="en-US" sz="2000" dirty="0" smtClean="0"/>
+              <a:t>透過宣告一個</a:t>
+            </a:r>
+            <a:r>
+              <a:rPr kumimoji="1" lang="zh-TW" altLang="en-US" sz="2000" dirty="0"/>
+              <a:t>物件</a:t>
+            </a:r>
+            <a:r>
+              <a:rPr kumimoji="1" lang="en-US" altLang="zh-TW" sz="2000" dirty="0" smtClean="0"/>
+              <a:t>, </a:t>
+            </a:r>
+            <a:r>
+              <a:rPr kumimoji="1" lang="zh-TW" altLang="en-US" sz="2000" dirty="0" smtClean="0"/>
+              <a:t>也是一個</a:t>
+            </a:r>
+            <a:r>
+              <a:rPr kumimoji="1" lang="zh-TW" altLang="en-US" sz="2000" dirty="0" smtClean="0"/>
+              <a:t>屬</a:t>
+            </a:r>
+            <a:r>
+              <a:rPr kumimoji="1" lang="zh-TW" altLang="en-US" sz="2000" dirty="0"/>
+              <a:t>性</a:t>
+            </a:r>
+            <a:r>
+              <a:rPr kumimoji="1" lang="en-US" altLang="zh-TW" sz="2000" dirty="0" smtClean="0"/>
+              <a:t>(</a:t>
+            </a:r>
+            <a:r>
+              <a:rPr kumimoji="1" lang="zh-TW" altLang="en-US" sz="2000" dirty="0" smtClean="0"/>
+              <a:t>在</a:t>
+            </a:r>
+            <a:r>
+              <a:rPr kumimoji="1" lang="en-US" altLang="zh-TW" sz="2000" dirty="0" smtClean="0"/>
+              <a:t> class </a:t>
+            </a:r>
+            <a:r>
+              <a:rPr kumimoji="1" lang="zh-TW" altLang="en-US" sz="2000" dirty="0" smtClean="0"/>
+              <a:t>從頭到尾都有影響力</a:t>
+            </a:r>
+            <a:r>
+              <a:rPr kumimoji="1" lang="en-US" altLang="zh-TW" sz="2000" dirty="0" smtClean="0"/>
+              <a:t>), </a:t>
+            </a:r>
+            <a:r>
+              <a:rPr kumimoji="1" lang="zh-TW" altLang="en-US" sz="2000" dirty="0" smtClean="0"/>
+              <a:t>取用規定在</a:t>
+            </a:r>
+            <a:r>
+              <a:rPr kumimoji="1" lang="en-US" altLang="zh-TW" sz="2000" dirty="0" smtClean="0"/>
+              <a:t> </a:t>
+            </a:r>
+            <a:r>
+              <a:rPr kumimoji="1" lang="en-US" altLang="zh-TW" sz="2000" dirty="0" err="1" smtClean="0"/>
+              <a:t>CLLocationManager</a:t>
+            </a:r>
+            <a:r>
+              <a:rPr kumimoji="1" lang="en-US" altLang="zh-TW" sz="2000" dirty="0" smtClean="0"/>
+              <a:t> </a:t>
+            </a:r>
+            <a:r>
+              <a:rPr kumimoji="1" lang="zh-TW" altLang="en-US" sz="2000" dirty="0" smtClean="0"/>
+              <a:t>裡的方法管理地理資料</a:t>
+            </a:r>
+            <a:r>
+              <a:rPr kumimoji="1" lang="en-US" altLang="zh-TW" sz="2000" dirty="0" smtClean="0"/>
+              <a:t>.</a:t>
+            </a:r>
+          </a:p>
+          <a:p>
+            <a:r>
+              <a:rPr kumimoji="1" lang="zh-TW" altLang="en-US" sz="2000" dirty="0" smtClean="0"/>
+              <a:t>實務上</a:t>
+            </a:r>
+            <a:r>
+              <a:rPr kumimoji="1" lang="en-US" altLang="zh-TW" sz="2000" dirty="0" smtClean="0"/>
+              <a:t>, </a:t>
+            </a:r>
+            <a:r>
+              <a:rPr kumimoji="1" lang="zh-TW" altLang="en-US" sz="2000" dirty="0" smtClean="0"/>
+              <a:t>一但建立了關係</a:t>
+            </a:r>
+            <a:r>
+              <a:rPr kumimoji="1" lang="en-US" altLang="zh-TW" sz="2000" dirty="0" smtClean="0"/>
+              <a:t>, </a:t>
+            </a:r>
+            <a:r>
+              <a:rPr kumimoji="1" lang="zh-TW" altLang="en-US" sz="2000" dirty="0" smtClean="0"/>
+              <a:t>當輸入</a:t>
+            </a:r>
+            <a:r>
+              <a:rPr kumimoji="1" lang="zh-TW" altLang="en-US" sz="2000" dirty="0" smtClean="0"/>
+              <a:t>物件</a:t>
+            </a:r>
+            <a:r>
+              <a:rPr kumimoji="1" lang="zh-TW" altLang="en-US" sz="2000" dirty="0" smtClean="0"/>
+              <a:t>的名字之後</a:t>
+            </a:r>
+            <a:r>
+              <a:rPr kumimoji="1" lang="en-US" altLang="zh-TW" sz="2000" dirty="0" smtClean="0"/>
+              <a:t>,</a:t>
+            </a:r>
+            <a:r>
+              <a:rPr kumimoji="1" lang="zh-TW" altLang="en-US" sz="2000" dirty="0" smtClean="0"/>
+              <a:t> </a:t>
+            </a:r>
+            <a:r>
+              <a:rPr kumimoji="1" lang="en-US" altLang="zh-TW" sz="2000" dirty="0"/>
+              <a:t>complier </a:t>
+            </a:r>
+            <a:r>
+              <a:rPr kumimoji="1" lang="zh-TW" altLang="en-US" sz="2000" dirty="0"/>
+              <a:t>自動識別</a:t>
+            </a:r>
+            <a:r>
+              <a:rPr kumimoji="1" lang="en-US" altLang="zh-TW" sz="2000" dirty="0" smtClean="0"/>
+              <a:t>,</a:t>
+            </a:r>
+            <a:r>
+              <a:rPr kumimoji="1" lang="zh-TW" altLang="en-US" sz="2000" dirty="0" smtClean="0"/>
+              <a:t>出現選單</a:t>
+            </a:r>
+            <a:r>
+              <a:rPr kumimoji="1" lang="en-US" altLang="zh-TW" sz="2000" dirty="0" smtClean="0"/>
+              <a:t>,</a:t>
+            </a:r>
+            <a:r>
+              <a:rPr kumimoji="1" lang="zh-TW" altLang="en-US" sz="2000" dirty="0" smtClean="0"/>
+              <a:t>提示可以選擇的地理方法或屬性的名字</a:t>
+            </a:r>
+            <a:r>
+              <a:rPr kumimoji="1" lang="en-US" altLang="zh-TW" sz="2000" dirty="0" smtClean="0"/>
+              <a:t>, </a:t>
+            </a:r>
+            <a:r>
+              <a:rPr kumimoji="1" lang="zh-TW" altLang="en-US" sz="2000" dirty="0" smtClean="0"/>
+              <a:t>讓</a:t>
+            </a:r>
+            <a:r>
+              <a:rPr kumimoji="1" lang="en-US" altLang="zh-TW" sz="2000" dirty="0" smtClean="0"/>
+              <a:t> programmer </a:t>
+            </a:r>
+            <a:r>
+              <a:rPr kumimoji="1" lang="zh-TW" altLang="en-US" sz="2000" dirty="0" smtClean="0"/>
+              <a:t>可以快速調用</a:t>
+            </a:r>
+            <a:r>
+              <a:rPr kumimoji="1" lang="en-US" altLang="zh-TW" sz="2000" dirty="0" smtClean="0"/>
+              <a:t>.</a:t>
+            </a:r>
+          </a:p>
+          <a:p>
+            <a:r>
+              <a:rPr kumimoji="1" lang="en-US" altLang="zh-TW" sz="2000" dirty="0" smtClean="0"/>
+              <a:t>Method </a:t>
+            </a:r>
+            <a:r>
+              <a:rPr kumimoji="1" lang="zh-TW" altLang="en-US" sz="2000" dirty="0" smtClean="0"/>
+              <a:t>的劃分</a:t>
+            </a:r>
+            <a:endParaRPr kumimoji="1" lang="en-US" altLang="zh-TW" sz="2000" dirty="0" smtClean="0"/>
+          </a:p>
+          <a:p>
+            <a:pPr lvl="1"/>
+            <a:r>
+              <a:rPr kumimoji="1" lang="en-US" altLang="zh-TW" sz="2000" dirty="0" smtClean="0"/>
+              <a:t>Class Method: </a:t>
+            </a:r>
+            <a:r>
+              <a:rPr kumimoji="1" lang="zh-TW" altLang="en-US" sz="2000" dirty="0" smtClean="0"/>
+              <a:t>規劃讓</a:t>
+            </a:r>
+            <a:r>
+              <a:rPr kumimoji="1" lang="en-US" altLang="zh-TW" sz="2000" dirty="0" smtClean="0"/>
+              <a:t> Class(</a:t>
+            </a:r>
+            <a:r>
+              <a:rPr kumimoji="1" lang="zh-TW" altLang="en-US" sz="2000" dirty="0" smtClean="0"/>
+              <a:t>例</a:t>
+            </a:r>
+            <a:r>
+              <a:rPr kumimoji="1" lang="en-US" altLang="zh-TW" sz="2000" dirty="0" smtClean="0"/>
+              <a:t>: </a:t>
+            </a:r>
+            <a:r>
+              <a:rPr kumimoji="1" lang="en-US" altLang="zh-TW" sz="2000" dirty="0" err="1" smtClean="0"/>
+              <a:t>CLLocationManager</a:t>
+            </a:r>
+            <a:r>
+              <a:rPr kumimoji="1" lang="en-US" altLang="zh-TW" sz="2000" dirty="0" smtClean="0"/>
+              <a:t>) </a:t>
+            </a:r>
+            <a:r>
+              <a:rPr kumimoji="1" lang="zh-TW" altLang="en-US" sz="2000" dirty="0" smtClean="0"/>
+              <a:t>執行的</a:t>
+            </a:r>
+            <a:r>
+              <a:rPr kumimoji="1" lang="en-US" altLang="zh-TW" sz="2000" dirty="0" smtClean="0"/>
+              <a:t> </a:t>
+            </a:r>
+            <a:r>
+              <a:rPr kumimoji="1" lang="en-US" altLang="zh-TW" sz="2000" dirty="0" err="1" smtClean="0"/>
+              <a:t>Mehtod</a:t>
+            </a:r>
+            <a:endParaRPr kumimoji="1" lang="en-US" altLang="zh-TW" sz="2000" dirty="0" smtClean="0"/>
+          </a:p>
+          <a:p>
+            <a:pPr lvl="1"/>
+            <a:r>
+              <a:rPr kumimoji="1" lang="en-US" altLang="zh-TW" sz="2000" dirty="0" smtClean="0"/>
+              <a:t>Instance Method: </a:t>
+            </a:r>
+            <a:r>
+              <a:rPr kumimoji="1" lang="zh-TW" altLang="en-US" sz="2000" dirty="0" smtClean="0"/>
+              <a:t>先要從</a:t>
+            </a:r>
+            <a:r>
+              <a:rPr kumimoji="1" lang="en-US" altLang="zh-TW" sz="2000" dirty="0" smtClean="0"/>
+              <a:t> Class </a:t>
+            </a:r>
+            <a:r>
+              <a:rPr kumimoji="1" lang="zh-TW" altLang="en-US" sz="2000" dirty="0" smtClean="0"/>
+              <a:t>建立一個</a:t>
+            </a:r>
+            <a:r>
+              <a:rPr kumimoji="1" lang="en-US" altLang="zh-TW" sz="2000" dirty="0" smtClean="0"/>
+              <a:t> Object, </a:t>
+            </a:r>
+            <a:r>
+              <a:rPr kumimoji="1" lang="zh-TW" altLang="en-US" sz="2000" dirty="0" smtClean="0"/>
+              <a:t>規劃讓</a:t>
+            </a:r>
+            <a:r>
+              <a:rPr kumimoji="1" lang="en-US" altLang="zh-TW" sz="2000" dirty="0" smtClean="0"/>
+              <a:t> Object (</a:t>
+            </a:r>
+            <a:r>
+              <a:rPr kumimoji="1" lang="zh-TW" altLang="en-US" sz="2000" dirty="0"/>
+              <a:t>例</a:t>
+            </a:r>
+            <a:r>
+              <a:rPr kumimoji="1" lang="en-US" altLang="zh-TW" sz="2000" dirty="0"/>
+              <a:t>: </a:t>
+            </a:r>
+            <a:r>
+              <a:rPr kumimoji="1" lang="en-US" altLang="zh-TW" sz="2000" dirty="0" err="1" smtClean="0"/>
+              <a:t>locationManager</a:t>
+            </a:r>
+            <a:r>
+              <a:rPr kumimoji="1" lang="en-US" altLang="zh-TW" sz="2000" dirty="0" smtClean="0"/>
+              <a:t> = </a:t>
+            </a:r>
+            <a:r>
+              <a:rPr kumimoji="1" lang="en-US" altLang="zh-TW" sz="2000" dirty="0" err="1" smtClean="0"/>
+              <a:t>CLLocationManager</a:t>
+            </a:r>
+            <a:r>
+              <a:rPr kumimoji="1" lang="en-US" altLang="zh-TW" sz="2000" dirty="0" smtClean="0"/>
+              <a:t>, ) </a:t>
+            </a:r>
+            <a:r>
+              <a:rPr kumimoji="1" lang="zh-TW" altLang="en-US" sz="2000" dirty="0"/>
+              <a:t>執行的</a:t>
+            </a:r>
+            <a:r>
+              <a:rPr kumimoji="1" lang="en-US" altLang="zh-TW" sz="2000" dirty="0"/>
+              <a:t> </a:t>
+            </a:r>
+            <a:r>
+              <a:rPr kumimoji="1" lang="en-US" altLang="zh-TW" sz="2000" dirty="0" err="1" smtClean="0"/>
+              <a:t>Mehtod</a:t>
+            </a:r>
+            <a:r>
+              <a:rPr kumimoji="1" lang="en-US" altLang="zh-TW" sz="2000" dirty="0" smtClean="0"/>
+              <a:t>.</a:t>
+            </a:r>
+            <a:endParaRPr kumimoji="1" lang="en-US" altLang="zh-TW" sz="2000" dirty="0" smtClean="0"/>
+          </a:p>
+          <a:p>
+            <a:r>
+              <a:rPr kumimoji="1" lang="en-US" altLang="zh-TW" sz="2000" dirty="0" smtClean="0"/>
+              <a:t>Class </a:t>
+            </a:r>
+            <a:r>
+              <a:rPr kumimoji="1" lang="mr-IN" altLang="zh-TW" sz="2000" dirty="0" smtClean="0"/>
+              <a:t>–</a:t>
+            </a:r>
+            <a:r>
+              <a:rPr kumimoji="1" lang="en-US" altLang="zh-TW" sz="2000" dirty="0" smtClean="0"/>
+              <a:t> subclass </a:t>
+            </a:r>
+            <a:r>
+              <a:rPr kumimoji="1" lang="zh-TW" altLang="en-US" sz="2000" dirty="0" smtClean="0"/>
+              <a:t>或</a:t>
+            </a:r>
+            <a:r>
+              <a:rPr kumimoji="1" lang="en-US" altLang="zh-TW" sz="2000" dirty="0" smtClean="0"/>
+              <a:t> Class </a:t>
+            </a:r>
+            <a:r>
+              <a:rPr kumimoji="1" lang="mr-IN" altLang="zh-TW" sz="2000" dirty="0" smtClean="0"/>
+              <a:t>–</a:t>
+            </a:r>
+            <a:r>
+              <a:rPr kumimoji="1" lang="en-US" altLang="zh-TW" sz="2000" dirty="0" smtClean="0"/>
+              <a:t> object </a:t>
+            </a:r>
+            <a:r>
+              <a:rPr kumimoji="1" lang="zh-TW" altLang="en-US" sz="2000" dirty="0" smtClean="0"/>
+              <a:t>代表在繼承關係的相對位置</a:t>
+            </a:r>
+            <a:r>
+              <a:rPr kumimoji="1" lang="en-US" altLang="zh-TW" sz="2000" dirty="0" smtClean="0"/>
+              <a:t>, </a:t>
+            </a:r>
+            <a:r>
+              <a:rPr kumimoji="1" lang="zh-TW" altLang="en-US" sz="2000" dirty="0" smtClean="0"/>
+              <a:t>某一個</a:t>
+            </a:r>
+            <a:r>
+              <a:rPr kumimoji="1" lang="en-US" altLang="zh-TW" sz="2000" dirty="0" smtClean="0"/>
+              <a:t> class </a:t>
+            </a:r>
+            <a:r>
+              <a:rPr kumimoji="1" lang="zh-TW" altLang="en-US" sz="2000" dirty="0" smtClean="0"/>
+              <a:t>可以是他爸爸的</a:t>
+            </a:r>
+            <a:r>
+              <a:rPr kumimoji="1" lang="en-US" altLang="zh-TW" sz="2000" dirty="0" smtClean="0"/>
+              <a:t> object,  </a:t>
+            </a:r>
+            <a:r>
+              <a:rPr kumimoji="1" lang="zh-TW" altLang="en-US" sz="2000" dirty="0" smtClean="0"/>
+              <a:t>可以是</a:t>
+            </a:r>
+            <a:r>
+              <a:rPr kumimoji="1" lang="zh-TW" altLang="en-US" sz="2000" dirty="0" smtClean="0"/>
+              <a:t>他子類的</a:t>
+            </a:r>
+            <a:r>
+              <a:rPr kumimoji="1" lang="en-US" altLang="zh-TW" sz="2000" dirty="0" smtClean="0"/>
+              <a:t> super class, </a:t>
+            </a:r>
+            <a:r>
+              <a:rPr kumimoji="1" lang="zh-TW" altLang="en-US" sz="2000" dirty="0" smtClean="0"/>
+              <a:t>名稱並不是絕對的</a:t>
+            </a:r>
+            <a:r>
+              <a:rPr kumimoji="1" lang="en-US" altLang="zh-TW" sz="2000" dirty="0" smtClean="0"/>
+              <a:t>.</a:t>
+            </a:r>
+            <a:endParaRPr kumimoji="1" lang="en-US" altLang="zh-TW" sz="2000" dirty="0" smtClean="0"/>
+          </a:p>
+        </p:txBody>
+      </p:sp>
+    </p:spTree>
+    <p:extLst>
+      <p:ext uri="{BB962C8B-B14F-4D97-AF65-F5344CB8AC3E}">
+        <p14:creationId xmlns:p14="http://schemas.microsoft.com/office/powerpoint/2010/main" val="2447137901"/>
+      </p:ext>
+    </p:extLst>
+  </p:cSld>
+  <p:clrMapOvr>
+    <a:masterClrMapping/>
+  </p:clrMapOvr>
+  <p:timing>
+    <p:tnLst>
+      <p:par>
+        <p:cTn xmlns:p14="http://schemas.microsoft.com/office/powerpoint/2010/main" id="1" dur="indefinite" restart="never" nodeType="tmRoot"/>
+      </p:par>
+    </p:tnLst>
+  </p:timing>
+</p:sld>
+</file>
+
+<file path=ppt/slides/slide12.xml><?xml version="1.0" encoding="utf-8"?>
+<p:sld xmlns:a="http://schemas.openxmlformats.org/drawingml/2006/main" xmlns:r="http://schemas.openxmlformats.org/officeDocument/2006/relationships" xmlns:p="http://schemas.openxmlformats.org/presentationml/2006/main">
+  <p:cSld>
+    <p:spTree>
+      <p:nvGrpSpPr>
+        <p:cNvPr id="1" name=""/>
+        <p:cNvGrpSpPr/>
+        <p:nvPr/>
+      </p:nvGrpSpPr>
+      <p:grpSpPr>
+        <a:xfrm>
+          <a:off x="0" y="0"/>
+          <a:ext cx="0" cy="0"/>
+          <a:chOff x="0" y="0"/>
+          <a:chExt cx="0" cy="0"/>
+        </a:xfrm>
+      </p:grpSpPr>
+      <p:sp>
+        <p:nvSpPr>
+          <p:cNvPr id="2" name="標題 1"/>
+          <p:cNvSpPr>
+            <a:spLocks noGrp="1"/>
+          </p:cNvSpPr>
+          <p:nvPr>
+            <p:ph type="title"/>
+          </p:nvPr>
+        </p:nvSpPr>
+        <p:spPr>
+          <a:xfrm>
+            <a:off x="0" y="-6513"/>
+            <a:ext cx="9144000" cy="748642"/>
+          </a:xfrm>
+        </p:spPr>
+        <p:txBody>
+          <a:bodyPr/>
+          <a:lstStyle/>
+          <a:p>
+            <a:r>
               <a:rPr kumimoji="1" lang="zh-TW" altLang="en-US" dirty="0" smtClean="0"/>
               <a:t>程式碼</a:t>
             </a:r>
@@ -4256,7 +4937,7 @@
 </p:sld>
 </file>
 
-<file path=ppt/slides/slide12.xml><?xml version="1.0" encoding="utf-8"?>
+<file path=ppt/slides/slide13.xml><?xml version="1.0" encoding="utf-8"?>
 <p:sld xmlns:a="http://schemas.openxmlformats.org/drawingml/2006/main" xmlns:r="http://schemas.openxmlformats.org/officeDocument/2006/relationships" xmlns:p="http://schemas.openxmlformats.org/presentationml/2006/main">
   <p:cSld>
     <p:spTree>
@@ -5238,7 +5919,7 @@
 </p:sld>
 </file>
 
-<file path=ppt/slides/slide13.xml><?xml version="1.0" encoding="utf-8"?>
+<file path=ppt/slides/slide14.xml><?xml version="1.0" encoding="utf-8"?>
 <p:sld xmlns:a="http://schemas.openxmlformats.org/drawingml/2006/main" xmlns:r="http://schemas.openxmlformats.org/officeDocument/2006/relationships" xmlns:p="http://schemas.openxmlformats.org/presentationml/2006/main">
   <p:cSld>
     <p:spTree>
@@ -5654,7 +6335,7 @@
 </p:sld>
 </file>
 
-<file path=ppt/slides/slide14.xml><?xml version="1.0" encoding="utf-8"?>
+<file path=ppt/slides/slide15.xml><?xml version="1.0" encoding="utf-8"?>
 <p:sld xmlns:a="http://schemas.openxmlformats.org/drawingml/2006/main" xmlns:r="http://schemas.openxmlformats.org/officeDocument/2006/relationships" xmlns:p="http://schemas.openxmlformats.org/presentationml/2006/main">
   <p:cSld>
     <p:spTree>
@@ -6317,7 +6998,7 @@
 </p:sld>
 </file>
 
-<file path=ppt/slides/slide15.xml><?xml version="1.0" encoding="utf-8"?>
+<file path=ppt/slides/slide16.xml><?xml version="1.0" encoding="utf-8"?>
 <p:sld xmlns:a="http://schemas.openxmlformats.org/drawingml/2006/main" xmlns:r="http://schemas.openxmlformats.org/officeDocument/2006/relationships" xmlns:p="http://schemas.openxmlformats.org/presentationml/2006/main">
   <p:cSld>
     <p:spTree>
@@ -7214,7 +7895,7 @@
 </p:sld>
 </file>
 
-<file path=ppt/slides/slide16.xml><?xml version="1.0" encoding="utf-8"?>
+<file path=ppt/slides/slide17.xml><?xml version="1.0" encoding="utf-8"?>
 <p:sld xmlns:a="http://schemas.openxmlformats.org/drawingml/2006/main" xmlns:r="http://schemas.openxmlformats.org/officeDocument/2006/relationships" xmlns:p="http://schemas.openxmlformats.org/presentationml/2006/main">
   <p:cSld>
     <p:spTree>
@@ -7700,7 +8381,7 @@
 </p:sld>
 </file>
 
-<file path=ppt/slides/slide17.xml><?xml version="1.0" encoding="utf-8"?>
+<file path=ppt/slides/slide18.xml><?xml version="1.0" encoding="utf-8"?>
 <p:sld xmlns:a="http://schemas.openxmlformats.org/drawingml/2006/main" xmlns:r="http://schemas.openxmlformats.org/officeDocument/2006/relationships" xmlns:p="http://schemas.openxmlformats.org/presentationml/2006/main">
   <p:cSld>
     <p:spTree>
@@ -8503,7 +9184,7 @@
 </p:sld>
 </file>
 
-<file path=ppt/slides/slide18.xml><?xml version="1.0" encoding="utf-8"?>
+<file path=ppt/slides/slide19.xml><?xml version="1.0" encoding="utf-8"?>
 <p:sld xmlns:a="http://schemas.openxmlformats.org/drawingml/2006/main" xmlns:r="http://schemas.openxmlformats.org/officeDocument/2006/relationships" xmlns:p="http://schemas.openxmlformats.org/presentationml/2006/main">
   <p:cSld>
     <p:spTree>
@@ -8948,7 +9629,155 @@
 </p:sld>
 </file>
 
-<file path=ppt/slides/slide19.xml><?xml version="1.0" encoding="utf-8"?>
+<file path=ppt/slides/slide2.xml><?xml version="1.0" encoding="utf-8"?>
+<p:sld xmlns:a="http://schemas.openxmlformats.org/drawingml/2006/main" xmlns:r="http://schemas.openxmlformats.org/officeDocument/2006/relationships" xmlns:p="http://schemas.openxmlformats.org/presentationml/2006/main">
+  <p:cSld>
+    <p:spTree>
+      <p:nvGrpSpPr>
+        <p:cNvPr id="1" name=""/>
+        <p:cNvGrpSpPr/>
+        <p:nvPr/>
+      </p:nvGrpSpPr>
+      <p:grpSpPr>
+        <a:xfrm>
+          <a:off x="0" y="0"/>
+          <a:ext cx="0" cy="0"/>
+          <a:chOff x="0" y="0"/>
+          <a:chExt cx="0" cy="0"/>
+        </a:xfrm>
+      </p:grpSpPr>
+      <p:sp>
+        <p:nvSpPr>
+          <p:cNvPr id="2" name="標題 1"/>
+          <p:cNvSpPr>
+            <a:spLocks noGrp="1"/>
+          </p:cNvSpPr>
+          <p:nvPr>
+            <p:ph type="title"/>
+          </p:nvPr>
+        </p:nvSpPr>
+        <p:spPr/>
+        <p:txBody>
+          <a:bodyPr/>
+          <a:lstStyle/>
+          <a:p>
+            <a:r>
+              <a:rPr kumimoji="1" lang="en-US" altLang="zh-TW" dirty="0" smtClean="0"/>
+              <a:t>Content</a:t>
+            </a:r>
+            <a:endParaRPr kumimoji="1" lang="zh-TW" altLang="en-US" dirty="0"/>
+          </a:p>
+        </p:txBody>
+      </p:sp>
+      <p:sp>
+        <p:nvSpPr>
+          <p:cNvPr id="3" name="內容版面配置區 2"/>
+          <p:cNvSpPr>
+            <a:spLocks noGrp="1"/>
+          </p:cNvSpPr>
+          <p:nvPr>
+            <p:ph idx="1"/>
+          </p:nvPr>
+        </p:nvSpPr>
+        <p:spPr>
+          <a:xfrm>
+            <a:off x="229251" y="1033585"/>
+            <a:ext cx="8693313" cy="3002253"/>
+          </a:xfrm>
+        </p:spPr>
+        <p:txBody>
+          <a:bodyPr>
+            <a:normAutofit/>
+          </a:bodyPr>
+          <a:lstStyle/>
+          <a:p>
+            <a:r>
+              <a:rPr kumimoji="1" lang="en-US" altLang="zh-TW" dirty="0" smtClean="0"/>
+              <a:t>Delegation</a:t>
+            </a:r>
+          </a:p>
+          <a:p>
+            <a:r>
+              <a:rPr kumimoji="1" lang="zh-TW" altLang="en-US" dirty="0"/>
+              <a:t>範例</a:t>
+            </a:r>
+            <a:r>
+              <a:rPr kumimoji="1" lang="en-US" altLang="zh-TW" dirty="0"/>
+              <a:t> </a:t>
+            </a:r>
+            <a:r>
+              <a:rPr kumimoji="1" lang="en-US" altLang="zh-TW" dirty="0" smtClean="0"/>
+              <a:t>2:</a:t>
+            </a:r>
+            <a:r>
+              <a:rPr kumimoji="1" lang="zh-TW" altLang="en-US" dirty="0" smtClean="0"/>
+              <a:t>午餐吃什麼勒～</a:t>
+            </a:r>
+            <a:endParaRPr kumimoji="1" lang="en-US" altLang="zh-TW" dirty="0" smtClean="0"/>
+          </a:p>
+          <a:p>
+            <a:pPr lvl="1"/>
+            <a:r>
+              <a:rPr kumimoji="1" lang="zh-TW" altLang="en-US" dirty="0" smtClean="0"/>
+              <a:t>解題思路步驟</a:t>
+            </a:r>
+            <a:endParaRPr kumimoji="1" lang="en-US" altLang="zh-TW" dirty="0" smtClean="0"/>
+          </a:p>
+          <a:p>
+            <a:pPr lvl="1"/>
+            <a:r>
+              <a:rPr kumimoji="1" lang="en-US" altLang="zh-TW" dirty="0" smtClean="0"/>
+              <a:t>Delegation </a:t>
+            </a:r>
+            <a:r>
+              <a:rPr kumimoji="1" lang="en-US" altLang="zh-TW" dirty="0" smtClean="0">
+                <a:sym typeface="Wingdings"/>
+              </a:rPr>
+              <a:t> Closure</a:t>
+            </a:r>
+            <a:endParaRPr kumimoji="1" lang="en-US" altLang="zh-TW" dirty="0" smtClean="0"/>
+          </a:p>
+          <a:p>
+            <a:r>
+              <a:rPr lang="en-US" altLang="zh-TW" dirty="0"/>
+              <a:t>Auto Layout </a:t>
+            </a:r>
+            <a:r>
+              <a:rPr lang="en-US" altLang="zh-TW" dirty="0" err="1"/>
+              <a:t>UIStackView</a:t>
+            </a:r>
+            <a:endParaRPr kumimoji="1" lang="en-US" altLang="zh-TW" dirty="0" smtClean="0"/>
+          </a:p>
+          <a:p>
+            <a:endParaRPr kumimoji="1" lang="en-US" altLang="zh-TW" dirty="0" smtClean="0"/>
+          </a:p>
+          <a:p>
+            <a:pPr lvl="1"/>
+            <a:endParaRPr kumimoji="1" lang="zh-TW" altLang="en-US" dirty="0"/>
+          </a:p>
+        </p:txBody>
+      </p:sp>
+    </p:spTree>
+    <p:extLst>
+      <p:ext uri="{BB962C8B-B14F-4D97-AF65-F5344CB8AC3E}">
+        <p14:creationId xmlns:p14="http://schemas.microsoft.com/office/powerpoint/2010/main" val="3408929265"/>
+      </p:ext>
+    </p:extLst>
+  </p:cSld>
+  <p:clrMapOvr>
+    <a:masterClrMapping/>
+  </p:clrMapOvr>
+  <p:timing>
+    <p:tnLst>
+      <p:par>
+        <p:cTn xmlns:p14="http://schemas.microsoft.com/office/powerpoint/2010/main" id="1" dur="indefinite" restart="never" nodeType="tmRoot"/>
+      </p:par>
+    </p:tnLst>
+  </p:timing>
+</p:sld>
+</file>
+
+<file path=ppt/slides/slide20.xml><?xml version="1.0" encoding="utf-8"?>
 <p:sld xmlns:a="http://schemas.openxmlformats.org/drawingml/2006/main" xmlns:r="http://schemas.openxmlformats.org/officeDocument/2006/relationships" xmlns:p="http://schemas.openxmlformats.org/presentationml/2006/main">
   <p:cSld>
     <p:spTree>
@@ -9458,155 +10287,7 @@
 </p:sld>
 </file>
 
-<file path=ppt/slides/slide2.xml><?xml version="1.0" encoding="utf-8"?>
-<p:sld xmlns:a="http://schemas.openxmlformats.org/drawingml/2006/main" xmlns:r="http://schemas.openxmlformats.org/officeDocument/2006/relationships" xmlns:p="http://schemas.openxmlformats.org/presentationml/2006/main">
-  <p:cSld>
-    <p:spTree>
-      <p:nvGrpSpPr>
-        <p:cNvPr id="1" name=""/>
-        <p:cNvGrpSpPr/>
-        <p:nvPr/>
-      </p:nvGrpSpPr>
-      <p:grpSpPr>
-        <a:xfrm>
-          <a:off x="0" y="0"/>
-          <a:ext cx="0" cy="0"/>
-          <a:chOff x="0" y="0"/>
-          <a:chExt cx="0" cy="0"/>
-        </a:xfrm>
-      </p:grpSpPr>
-      <p:sp>
-        <p:nvSpPr>
-          <p:cNvPr id="2" name="標題 1"/>
-          <p:cNvSpPr>
-            <a:spLocks noGrp="1"/>
-          </p:cNvSpPr>
-          <p:nvPr>
-            <p:ph type="title"/>
-          </p:nvPr>
-        </p:nvSpPr>
-        <p:spPr/>
-        <p:txBody>
-          <a:bodyPr/>
-          <a:lstStyle/>
-          <a:p>
-            <a:r>
-              <a:rPr kumimoji="1" lang="en-US" altLang="zh-TW" dirty="0" smtClean="0"/>
-              <a:t>Content</a:t>
-            </a:r>
-            <a:endParaRPr kumimoji="1" lang="zh-TW" altLang="en-US" dirty="0"/>
-          </a:p>
-        </p:txBody>
-      </p:sp>
-      <p:sp>
-        <p:nvSpPr>
-          <p:cNvPr id="3" name="內容版面配置區 2"/>
-          <p:cNvSpPr>
-            <a:spLocks noGrp="1"/>
-          </p:cNvSpPr>
-          <p:nvPr>
-            <p:ph idx="1"/>
-          </p:nvPr>
-        </p:nvSpPr>
-        <p:spPr>
-          <a:xfrm>
-            <a:off x="229251" y="1033585"/>
-            <a:ext cx="8693313" cy="3002253"/>
-          </a:xfrm>
-        </p:spPr>
-        <p:txBody>
-          <a:bodyPr>
-            <a:normAutofit/>
-          </a:bodyPr>
-          <a:lstStyle/>
-          <a:p>
-            <a:r>
-              <a:rPr kumimoji="1" lang="en-US" altLang="zh-TW" dirty="0" smtClean="0"/>
-              <a:t>Delegation</a:t>
-            </a:r>
-          </a:p>
-          <a:p>
-            <a:r>
-              <a:rPr kumimoji="1" lang="zh-TW" altLang="en-US" dirty="0"/>
-              <a:t>範例</a:t>
-            </a:r>
-            <a:r>
-              <a:rPr kumimoji="1" lang="en-US" altLang="zh-TW" dirty="0"/>
-              <a:t> </a:t>
-            </a:r>
-            <a:r>
-              <a:rPr kumimoji="1" lang="en-US" altLang="zh-TW" dirty="0" smtClean="0"/>
-              <a:t>2:</a:t>
-            </a:r>
-            <a:r>
-              <a:rPr kumimoji="1" lang="zh-TW" altLang="en-US" dirty="0" smtClean="0"/>
-              <a:t>午餐吃什麼勒～</a:t>
-            </a:r>
-            <a:endParaRPr kumimoji="1" lang="en-US" altLang="zh-TW" dirty="0" smtClean="0"/>
-          </a:p>
-          <a:p>
-            <a:pPr lvl="1"/>
-            <a:r>
-              <a:rPr kumimoji="1" lang="zh-TW" altLang="en-US" dirty="0" smtClean="0"/>
-              <a:t>解題思路步驟</a:t>
-            </a:r>
-            <a:endParaRPr kumimoji="1" lang="en-US" altLang="zh-TW" dirty="0" smtClean="0"/>
-          </a:p>
-          <a:p>
-            <a:pPr lvl="1"/>
-            <a:r>
-              <a:rPr kumimoji="1" lang="en-US" altLang="zh-TW" dirty="0" smtClean="0"/>
-              <a:t>Delegation </a:t>
-            </a:r>
-            <a:r>
-              <a:rPr kumimoji="1" lang="en-US" altLang="zh-TW" dirty="0" smtClean="0">
-                <a:sym typeface="Wingdings"/>
-              </a:rPr>
-              <a:t> Closure</a:t>
-            </a:r>
-            <a:endParaRPr kumimoji="1" lang="en-US" altLang="zh-TW" dirty="0" smtClean="0"/>
-          </a:p>
-          <a:p>
-            <a:r>
-              <a:rPr lang="en-US" altLang="zh-TW" dirty="0"/>
-              <a:t>Auto Layout </a:t>
-            </a:r>
-            <a:r>
-              <a:rPr lang="en-US" altLang="zh-TW" dirty="0" err="1"/>
-              <a:t>UIStackView</a:t>
-            </a:r>
-            <a:endParaRPr kumimoji="1" lang="en-US" altLang="zh-TW" dirty="0" smtClean="0"/>
-          </a:p>
-          <a:p>
-            <a:endParaRPr kumimoji="1" lang="en-US" altLang="zh-TW" dirty="0" smtClean="0"/>
-          </a:p>
-          <a:p>
-            <a:pPr lvl="1"/>
-            <a:endParaRPr kumimoji="1" lang="zh-TW" altLang="en-US" dirty="0"/>
-          </a:p>
-        </p:txBody>
-      </p:sp>
-    </p:spTree>
-    <p:extLst>
-      <p:ext uri="{BB962C8B-B14F-4D97-AF65-F5344CB8AC3E}">
-        <p14:creationId xmlns:p14="http://schemas.microsoft.com/office/powerpoint/2010/main" val="3408929265"/>
-      </p:ext>
-    </p:extLst>
-  </p:cSld>
-  <p:clrMapOvr>
-    <a:masterClrMapping/>
-  </p:clrMapOvr>
-  <p:timing>
-    <p:tnLst>
-      <p:par>
-        <p:cTn xmlns:p14="http://schemas.microsoft.com/office/powerpoint/2010/main" id="1" dur="indefinite" restart="never" nodeType="tmRoot"/>
-      </p:par>
-    </p:tnLst>
-  </p:timing>
-</p:sld>
-</file>
-
-<file path=ppt/slides/slide20.xml><?xml version="1.0" encoding="utf-8"?>
+<file path=ppt/slides/slide21.xml><?xml version="1.0" encoding="utf-8"?>
 <p:sld xmlns:a="http://schemas.openxmlformats.org/drawingml/2006/main" xmlns:r="http://schemas.openxmlformats.org/officeDocument/2006/relationships" xmlns:p="http://schemas.openxmlformats.org/presentationml/2006/main">
   <p:cSld>
     <p:spTree>
@@ -9700,7 +10381,7 @@
 </p:sld>
 </file>
 
-<file path=ppt/slides/slide21.xml><?xml version="1.0" encoding="utf-8"?>
+<file path=ppt/slides/slide22.xml><?xml version="1.0" encoding="utf-8"?>
 <p:sld xmlns:a="http://schemas.openxmlformats.org/drawingml/2006/main" xmlns:r="http://schemas.openxmlformats.org/officeDocument/2006/relationships" xmlns:p="http://schemas.openxmlformats.org/presentationml/2006/main">
   <p:cSld>
     <p:spTree>
@@ -9947,7 +10628,7 @@
 </p:sld>
 </file>
 
-<file path=ppt/slides/slide22.xml><?xml version="1.0" encoding="utf-8"?>
+<file path=ppt/slides/slide23.xml><?xml version="1.0" encoding="utf-8"?>
 <p:sld xmlns:a="http://schemas.openxmlformats.org/drawingml/2006/main" xmlns:r="http://schemas.openxmlformats.org/officeDocument/2006/relationships" xmlns:p="http://schemas.openxmlformats.org/presentationml/2006/main">
   <p:cSld>
     <p:spTree>
@@ -10395,7 +11076,7 @@
 </p:sld>
 </file>
 
-<file path=ppt/slides/slide23.xml><?xml version="1.0" encoding="utf-8"?>
+<file path=ppt/slides/slide24.xml><?xml version="1.0" encoding="utf-8"?>
 <p:sld xmlns:a="http://schemas.openxmlformats.org/drawingml/2006/main" xmlns:r="http://schemas.openxmlformats.org/officeDocument/2006/relationships" xmlns:p="http://schemas.openxmlformats.org/presentationml/2006/main">
   <p:cSld>
     <p:spTree>
@@ -10924,7 +11605,7 @@
 </p:sld>
 </file>
 
-<file path=ppt/slides/slide24.xml><?xml version="1.0" encoding="utf-8"?>
+<file path=ppt/slides/slide25.xml><?xml version="1.0" encoding="utf-8"?>
 <p:sld xmlns:a="http://schemas.openxmlformats.org/drawingml/2006/main" xmlns:r="http://schemas.openxmlformats.org/officeDocument/2006/relationships" xmlns:p="http://schemas.openxmlformats.org/presentationml/2006/main">
   <p:cSld>
     <p:spTree>
@@ -11550,7 +12231,7 @@
 </p:sld>
 </file>
 
-<file path=ppt/slides/slide25.xml><?xml version="1.0" encoding="utf-8"?>
+<file path=ppt/slides/slide26.xml><?xml version="1.0" encoding="utf-8"?>
 <p:sld xmlns:a="http://schemas.openxmlformats.org/drawingml/2006/main" xmlns:r="http://schemas.openxmlformats.org/officeDocument/2006/relationships" xmlns:p="http://schemas.openxmlformats.org/presentationml/2006/main">
   <p:cSld>
     <p:spTree>
@@ -11748,8 +12429,8 @@
         </p:nvSpPr>
         <p:spPr>
           <a:xfrm>
-            <a:off x="5378194" y="1378701"/>
-            <a:ext cx="2818506" cy="1011049"/>
+            <a:off x="5378193" y="1378701"/>
+            <a:ext cx="3420100" cy="1011049"/>
           </a:xfrm>
           <a:prstGeom prst="wedgeRectCallout">
             <a:avLst>
@@ -11895,7 +12576,63 @@
                   <a:srgbClr val="FF0000"/>
                 </a:solidFill>
               </a:rPr>
-              <a:t>是為</a:t>
+              <a:t>藉由</a:t>
+            </a:r>
+            <a:r>
+              <a:rPr kumimoji="1" lang="en-US" altLang="zh-TW" sz="1400" dirty="0" smtClean="0">
+                <a:solidFill>
+                  <a:srgbClr val="FF0000"/>
+                </a:solidFill>
+              </a:rPr>
+              <a:t> </a:t>
+            </a:r>
+            <a:r>
+              <a:rPr kumimoji="1" lang="en-US" altLang="zh-TW" sz="1400" dirty="0" err="1" smtClean="0">
+                <a:solidFill>
+                  <a:srgbClr val="FF0000"/>
+                </a:solidFill>
+              </a:rPr>
+              <a:t>completionhandler</a:t>
+            </a:r>
+            <a:r>
+              <a:rPr kumimoji="1" lang="en-US" altLang="zh-TW" sz="1400" dirty="0" smtClean="0">
+                <a:solidFill>
+                  <a:srgbClr val="FF0000"/>
+                </a:solidFill>
+              </a:rPr>
+              <a:t> </a:t>
+            </a:r>
+            <a:r>
+              <a:rPr kumimoji="1" lang="zh-TW" altLang="en-US" sz="1400" dirty="0" smtClean="0">
+                <a:solidFill>
+                  <a:srgbClr val="FF0000"/>
+                </a:solidFill>
+              </a:rPr>
+              <a:t>回傳</a:t>
+            </a:r>
+            <a:r>
+              <a:rPr kumimoji="1" lang="en-US" altLang="zh-TW" sz="1400" dirty="0" smtClean="0">
+                <a:solidFill>
+                  <a:srgbClr val="FF0000"/>
+                </a:solidFill>
+              </a:rPr>
+              <a:t>, </a:t>
+            </a:r>
+            <a:r>
+              <a:rPr kumimoji="1" lang="zh-TW" altLang="en-US" sz="1400" dirty="0" smtClean="0">
+                <a:solidFill>
+                  <a:srgbClr val="FF0000"/>
+                </a:solidFill>
+              </a:rPr>
+              <a:t>是</a:t>
+            </a:r>
+            <a:r>
+              <a:rPr kumimoji="1" lang="zh-TW" altLang="en-US" sz="1400" dirty="0" smtClean="0">
+                <a:solidFill>
+                  <a:srgbClr val="FF0000"/>
+                </a:solidFill>
+              </a:rPr>
+              <a:t>為</a:t>
             </a:r>
             <a:r>
               <a:rPr kumimoji="1" lang="en-US" altLang="zh-TW" sz="1400" dirty="0" smtClean="0">
@@ -12261,12 +12998,12 @@
         <p:spPr>
           <a:xfrm>
             <a:off x="601594" y="5366979"/>
-            <a:ext cx="2297748" cy="807937"/>
+            <a:ext cx="2450148" cy="807937"/>
           </a:xfrm>
           <a:prstGeom prst="wedgeRectCallout">
             <a:avLst>
-              <a:gd name="adj1" fmla="val 78428"/>
-              <a:gd name="adj2" fmla="val -50101"/>
+              <a:gd name="adj1" fmla="val 72625"/>
+              <a:gd name="adj2" fmla="val -53620"/>
             </a:avLst>
           </a:prstGeom>
           <a:solidFill>
@@ -12322,12 +13059,28 @@
               <a:t> </a:t>
             </a:r>
             <a:r>
+              <a:rPr kumimoji="1" lang="en-US" altLang="zh-TW" sz="1400" dirty="0">
+                <a:solidFill>
+                  <a:srgbClr val="FF0000"/>
+                </a:solidFill>
+              </a:rPr>
+              <a:t> </a:t>
+            </a:r>
+            <a:r>
+              <a:rPr kumimoji="1" lang="en-US" altLang="zh-TW" sz="1400" dirty="0" smtClean="0">
+                <a:solidFill>
+                  <a:srgbClr val="FF0000"/>
+                </a:solidFill>
+              </a:rPr>
+              <a:t>Class </a:t>
+            </a:r>
+            <a:r>
               <a:rPr kumimoji="1" lang="zh-TW" altLang="en-US" sz="1400" dirty="0" smtClean="0">
                 <a:solidFill>
                   <a:srgbClr val="FF0000"/>
                 </a:solidFill>
               </a:rPr>
-              <a:t>函式的形式參數</a:t>
+              <a:t>屬性的</a:t>
             </a:r>
             <a:r>
               <a:rPr kumimoji="1" lang="en-US" altLang="zh-TW" sz="1400" dirty="0" err="1" smtClean="0">
@@ -12351,7 +13104,23 @@
                   <a:srgbClr val="FF0000"/>
                 </a:solidFill>
               </a:rPr>
-              <a:t>因為同名故加</a:t>
+              <a:t>因為</a:t>
+            </a:r>
+            <a:r>
+              <a:rPr kumimoji="1" lang="zh-TW" altLang="en-US" sz="1400" dirty="0" smtClean="0">
+                <a:solidFill>
+                  <a:srgbClr val="FF0000"/>
+                </a:solidFill>
+              </a:rPr>
+              <a:t>與形式參數</a:t>
+            </a:r>
+            <a:r>
+              <a:rPr kumimoji="1" lang="zh-TW" altLang="en-US" sz="1400" dirty="0" smtClean="0">
+                <a:solidFill>
+                  <a:srgbClr val="FF0000"/>
+                </a:solidFill>
+              </a:rPr>
+              <a:t>同名</a:t>
             </a:r>
             <a:r>
               <a:rPr kumimoji="1" lang="en-US" altLang="zh-TW" sz="1400" dirty="0" smtClean="0">
@@ -12359,7 +13128,31 @@
                   <a:srgbClr val="FF0000"/>
                 </a:solidFill>
               </a:rPr>
-              <a:t> self </a:t>
+              <a:t>, </a:t>
+            </a:r>
+            <a:r>
+              <a:rPr kumimoji="1" lang="zh-TW" altLang="en-US" sz="1400" dirty="0" smtClean="0">
+                <a:solidFill>
+                  <a:srgbClr val="FF0000"/>
+                </a:solidFill>
+              </a:rPr>
+              <a:t>故加</a:t>
+            </a:r>
+            <a:r>
+              <a:rPr kumimoji="1" lang="en-US" altLang="zh-TW" sz="1400" dirty="0" smtClean="0">
+                <a:solidFill>
+                  <a:srgbClr val="FF0000"/>
+                </a:solidFill>
+              </a:rPr>
+              <a:t> </a:t>
+            </a:r>
+            <a:r>
+              <a:rPr kumimoji="1" lang="en-US" altLang="zh-TW" sz="1400" dirty="0" smtClean="0">
+                <a:solidFill>
+                  <a:srgbClr val="FF0000"/>
+                </a:solidFill>
+              </a:rPr>
+              <a:t>self </a:t>
             </a:r>
             <a:r>
               <a:rPr kumimoji="1" lang="zh-TW" altLang="en-US" sz="1400" dirty="0" smtClean="0">
@@ -12797,7 +13590,2747 @@
 </p:sld>
 </file>
 
-<file path=ppt/slides/slide26.xml><?xml version="1.0" encoding="utf-8"?>
+<file path=ppt/slides/slide27.xml><?xml version="1.0" encoding="utf-8"?>
+<p:sld xmlns:a="http://schemas.openxmlformats.org/drawingml/2006/main" xmlns:r="http://schemas.openxmlformats.org/officeDocument/2006/relationships" xmlns:p="http://schemas.openxmlformats.org/presentationml/2006/main">
+  <p:cSld>
+    <p:spTree>
+      <p:nvGrpSpPr>
+        <p:cNvPr id="1" name=""/>
+        <p:cNvGrpSpPr/>
+        <p:nvPr/>
+      </p:nvGrpSpPr>
+      <p:grpSpPr>
+        <a:xfrm>
+          <a:off x="0" y="0"/>
+          <a:ext cx="0" cy="0"/>
+          <a:chOff x="0" y="0"/>
+          <a:chExt cx="0" cy="0"/>
+        </a:xfrm>
+      </p:grpSpPr>
+      <p:pic>
+        <p:nvPicPr>
+          <p:cNvPr id="6" name="圖片 5" descr="螢幕快照 2017-04-01 上午12.33.10.png"/>
+          <p:cNvPicPr>
+            <a:picLocks noChangeAspect="1"/>
+          </p:cNvPicPr>
+          <p:nvPr/>
+        </p:nvPicPr>
+        <p:blipFill>
+          <a:blip r:embed="rId2">
+            <a:extLst>
+              <a:ext uri="{28A0092B-C50C-407E-A947-70E740481C1C}">
+                <a14:useLocalDpi xmlns:a14="http://schemas.microsoft.com/office/drawing/2010/main" val="0"/>
+              </a:ext>
+            </a:extLst>
+          </a:blip>
+          <a:stretch>
+            <a:fillRect/>
+          </a:stretch>
+        </p:blipFill>
+        <p:spPr>
+          <a:xfrm>
+            <a:off x="748770" y="2513714"/>
+            <a:ext cx="7260228" cy="4264635"/>
+          </a:xfrm>
+          <a:prstGeom prst="rect">
+            <a:avLst/>
+          </a:prstGeom>
+        </p:spPr>
+      </p:pic>
+      <p:sp>
+        <p:nvSpPr>
+          <p:cNvPr id="2" name="標題 1"/>
+          <p:cNvSpPr>
+            <a:spLocks noGrp="1"/>
+          </p:cNvSpPr>
+          <p:nvPr>
+            <p:ph type="title"/>
+          </p:nvPr>
+        </p:nvSpPr>
+        <p:spPr/>
+        <p:txBody>
+          <a:bodyPr/>
+          <a:lstStyle/>
+          <a:p>
+            <a:r>
+              <a:rPr lang="zh-TW" altLang="en-US" dirty="0" smtClean="0"/>
+              <a:t>非同步的說明</a:t>
+            </a:r>
+            <a:endParaRPr lang="zh-TW" altLang="en-US" dirty="0"/>
+          </a:p>
+        </p:txBody>
+      </p:sp>
+      <p:sp>
+        <p:nvSpPr>
+          <p:cNvPr id="3" name="內容版面配置區 2"/>
+          <p:cNvSpPr>
+            <a:spLocks noGrp="1"/>
+          </p:cNvSpPr>
+          <p:nvPr>
+            <p:ph idx="1"/>
+          </p:nvPr>
+        </p:nvSpPr>
+        <p:spPr>
+          <a:xfrm>
+            <a:off x="229251" y="748705"/>
+            <a:ext cx="8693313" cy="1421593"/>
+          </a:xfrm>
+        </p:spPr>
+        <p:txBody>
+          <a:bodyPr>
+            <a:normAutofit fontScale="92500" lnSpcReduction="20000"/>
+          </a:bodyPr>
+          <a:lstStyle/>
+          <a:p>
+            <a:r>
+              <a:rPr lang="zh-TW" altLang="en-US" dirty="0" smtClean="0">
+                <a:sym typeface="Wingdings" panose="05000000000000000000" pitchFamily="2" charset="2"/>
+              </a:rPr>
+              <a:t>執行</a:t>
+            </a:r>
+            <a:r>
+              <a:rPr lang="en-US" altLang="zh-TW" dirty="0" smtClean="0">
+                <a:sym typeface="Wingdings" panose="05000000000000000000" pitchFamily="2" charset="2"/>
+              </a:rPr>
+              <a:t> </a:t>
+            </a:r>
+            <a:r>
+              <a:rPr lang="en-US" altLang="zh-TW" dirty="0" err="1" smtClean="0">
+                <a:sym typeface="Wingdings" panose="05000000000000000000" pitchFamily="2" charset="2"/>
+              </a:rPr>
+              <a:t>locationManager.requestlocation</a:t>
+            </a:r>
+            <a:r>
+              <a:rPr lang="en-US" altLang="zh-TW" dirty="0" smtClean="0">
+                <a:sym typeface="Wingdings" panose="05000000000000000000" pitchFamily="2" charset="2"/>
+              </a:rPr>
+              <a:t>() </a:t>
+            </a:r>
+            <a:r>
+              <a:rPr lang="zh-TW" altLang="en-US" dirty="0" smtClean="0">
+                <a:sym typeface="Wingdings" panose="05000000000000000000" pitchFamily="2" charset="2"/>
+              </a:rPr>
+              <a:t>到得到位置不知道花多久</a:t>
+            </a:r>
+            <a:r>
+              <a:rPr lang="en-US" altLang="zh-TW" dirty="0" smtClean="0">
+                <a:sym typeface="Wingdings" panose="05000000000000000000" pitchFamily="2" charset="2"/>
+              </a:rPr>
+              <a:t>? </a:t>
+            </a:r>
+            <a:endParaRPr lang="en-US" altLang="zh-TW" dirty="0">
+              <a:sym typeface="Wingdings" panose="05000000000000000000" pitchFamily="2" charset="2"/>
+            </a:endParaRPr>
+          </a:p>
+          <a:p>
+            <a:r>
+              <a:rPr lang="zh-TW" altLang="en-US" dirty="0" smtClean="0">
+                <a:sym typeface="Wingdings" panose="05000000000000000000" pitchFamily="2" charset="2"/>
+              </a:rPr>
+              <a:t>只有在收到位置後觸發</a:t>
+            </a:r>
+            <a:r>
+              <a:rPr lang="en-US" altLang="zh-TW" dirty="0" smtClean="0">
+                <a:sym typeface="Wingdings" panose="05000000000000000000" pitchFamily="2" charset="2"/>
+              </a:rPr>
+              <a:t> </a:t>
+            </a:r>
+            <a:r>
+              <a:rPr lang="en-US" altLang="zh-TW" dirty="0" err="1" smtClean="0"/>
+              <a:t>locationManager</a:t>
+            </a:r>
+            <a:r>
+              <a:rPr lang="en-US" altLang="zh-TW" dirty="0"/>
+              <a:t>(_:</a:t>
+            </a:r>
+            <a:r>
+              <a:rPr lang="en-US" altLang="zh-TW" dirty="0" err="1"/>
+              <a:t>didUpdateLocations</a:t>
+            </a:r>
+            <a:r>
+              <a:rPr lang="en-US" altLang="zh-TW" dirty="0"/>
+              <a:t>:)</a:t>
+            </a:r>
+            <a:r>
+              <a:rPr lang="en-US" altLang="zh-TW" dirty="0" smtClean="0">
+                <a:sym typeface="Wingdings" panose="05000000000000000000" pitchFamily="2" charset="2"/>
+              </a:rPr>
+              <a:t> </a:t>
+            </a:r>
+            <a:r>
+              <a:rPr lang="zh-TW" altLang="en-US" dirty="0" smtClean="0">
+                <a:sym typeface="Wingdings" panose="05000000000000000000" pitchFamily="2" charset="2"/>
+              </a:rPr>
+              <a:t>方法</a:t>
+            </a:r>
+            <a:r>
+              <a:rPr lang="en-US" altLang="zh-TW" dirty="0" smtClean="0">
+                <a:sym typeface="Wingdings" panose="05000000000000000000" pitchFamily="2" charset="2"/>
+              </a:rPr>
+              <a:t>. </a:t>
+            </a:r>
+            <a:r>
+              <a:rPr lang="zh-TW" altLang="en-US" dirty="0" smtClean="0">
+                <a:sym typeface="Wingdings" panose="05000000000000000000" pitchFamily="2" charset="2"/>
+              </a:rPr>
+              <a:t>名稱含兩個字段</a:t>
+            </a:r>
+            <a:r>
+              <a:rPr lang="en-US" altLang="zh-TW" dirty="0" smtClean="0">
+                <a:sym typeface="Wingdings" panose="05000000000000000000" pitchFamily="2" charset="2"/>
+              </a:rPr>
+              <a:t>.</a:t>
+            </a:r>
+          </a:p>
+          <a:p>
+            <a:r>
+              <a:rPr lang="zh-TW" altLang="en-US" dirty="0" smtClean="0">
+                <a:sym typeface="Wingdings" panose="05000000000000000000" pitchFamily="2" charset="2"/>
+              </a:rPr>
+              <a:t>此為非同步</a:t>
+            </a:r>
+            <a:r>
+              <a:rPr lang="en-US" altLang="zh-TW" dirty="0" smtClean="0">
+                <a:sym typeface="Wingdings" panose="05000000000000000000" pitchFamily="2" charset="2"/>
+              </a:rPr>
+              <a:t>.</a:t>
+            </a:r>
+            <a:endParaRPr lang="en-US" altLang="zh-TW" dirty="0" smtClean="0">
+              <a:sym typeface="Wingdings" panose="05000000000000000000" pitchFamily="2" charset="2"/>
+            </a:endParaRPr>
+          </a:p>
+        </p:txBody>
+      </p:sp>
+      <p:sp>
+        <p:nvSpPr>
+          <p:cNvPr id="14" name="矩形圖說文字 13"/>
+          <p:cNvSpPr/>
+          <p:nvPr/>
+        </p:nvSpPr>
+        <p:spPr>
+          <a:xfrm>
+            <a:off x="5904859" y="2814754"/>
+            <a:ext cx="2682302" cy="976160"/>
+          </a:xfrm>
+          <a:prstGeom prst="wedgeRectCallout">
+            <a:avLst>
+              <a:gd name="adj1" fmla="val -36506"/>
+              <a:gd name="adj2" fmla="val 89258"/>
+            </a:avLst>
+          </a:prstGeom>
+          <a:solidFill>
+            <a:srgbClr val="FFFF00"/>
+          </a:solidFill>
+          <a:ln w="28575" cmpd="sng">
+            <a:solidFill>
+              <a:srgbClr val="FF0000"/>
+            </a:solidFill>
+          </a:ln>
+        </p:spPr>
+        <p:style>
+          <a:lnRef idx="1">
+            <a:schemeClr val="accent1"/>
+          </a:lnRef>
+          <a:fillRef idx="3">
+            <a:schemeClr val="accent1"/>
+          </a:fillRef>
+          <a:effectRef idx="2">
+            <a:schemeClr val="accent1"/>
+          </a:effectRef>
+          <a:fontRef idx="minor">
+            <a:schemeClr val="lt1"/>
+          </a:fontRef>
+        </p:style>
+        <p:txBody>
+          <a:bodyPr rtlCol="0" anchor="ctr"/>
+          <a:lstStyle/>
+          <a:p>
+            <a:pPr algn="ctr"/>
+            <a:r>
+              <a:rPr kumimoji="1" lang="en-US" altLang="zh-TW" sz="1600" dirty="0" err="1" smtClean="0">
+                <a:solidFill>
+                  <a:srgbClr val="FF0000"/>
+                </a:solidFill>
+              </a:rPr>
+              <a:t>CLLocationManager</a:t>
+            </a:r>
+            <a:r>
+              <a:rPr kumimoji="1" lang="en-US" altLang="zh-TW" sz="1600" dirty="0" smtClean="0">
+                <a:solidFill>
+                  <a:srgbClr val="FF0000"/>
+                </a:solidFill>
+              </a:rPr>
+              <a:t> </a:t>
+            </a:r>
+            <a:r>
+              <a:rPr kumimoji="1" lang="zh-TW" altLang="en-US" sz="1600" dirty="0" smtClean="0">
+                <a:solidFill>
+                  <a:srgbClr val="FF0000"/>
+                </a:solidFill>
+              </a:rPr>
+              <a:t>通知</a:t>
+            </a:r>
+            <a:r>
+              <a:rPr kumimoji="1" lang="en-US" altLang="zh-TW" sz="1600" dirty="0" smtClean="0">
+                <a:solidFill>
+                  <a:srgbClr val="FF0000"/>
+                </a:solidFill>
+              </a:rPr>
+              <a:t> delegate </a:t>
+            </a:r>
+            <a:r>
+              <a:rPr kumimoji="1" lang="zh-TW" altLang="en-US" sz="1600" dirty="0" smtClean="0">
+                <a:solidFill>
+                  <a:srgbClr val="FF0000"/>
+                </a:solidFill>
+              </a:rPr>
+              <a:t>的</a:t>
+            </a:r>
+            <a:r>
+              <a:rPr kumimoji="1" lang="en-US" altLang="zh-TW" sz="1600" dirty="0" smtClean="0">
+                <a:solidFill>
+                  <a:srgbClr val="FF0000"/>
+                </a:solidFill>
+              </a:rPr>
+              <a:t>, </a:t>
+            </a:r>
+            <a:r>
+              <a:rPr kumimoji="1" lang="zh-TW" altLang="en-US" sz="1600" dirty="0" smtClean="0">
+                <a:solidFill>
+                  <a:srgbClr val="FF0000"/>
+                </a:solidFill>
+              </a:rPr>
+              <a:t>然後執行方法</a:t>
+            </a:r>
+            <a:r>
+              <a:rPr kumimoji="1" lang="en-US" altLang="zh-TW" sz="1600" dirty="0" smtClean="0">
+                <a:solidFill>
+                  <a:srgbClr val="FF0000"/>
+                </a:solidFill>
+              </a:rPr>
+              <a:t>.</a:t>
+            </a:r>
+            <a:endParaRPr kumimoji="1" lang="zh-TW" altLang="en-US" sz="1600" dirty="0">
+              <a:solidFill>
+                <a:srgbClr val="FF0000"/>
+              </a:solidFill>
+            </a:endParaRPr>
+          </a:p>
+        </p:txBody>
+      </p:sp>
+      <p:sp>
+        <p:nvSpPr>
+          <p:cNvPr id="15" name="矩形 14"/>
+          <p:cNvSpPr/>
+          <p:nvPr/>
+        </p:nvSpPr>
+        <p:spPr>
+          <a:xfrm>
+            <a:off x="1003862" y="4245059"/>
+            <a:ext cx="7005136" cy="1044029"/>
+          </a:xfrm>
+          <a:prstGeom prst="rect">
+            <a:avLst/>
+          </a:prstGeom>
+          <a:noFill/>
+          <a:ln w="19050" cmpd="sng">
+            <a:solidFill>
+              <a:srgbClr val="FF0000"/>
+            </a:solidFill>
+            <a:prstDash val="solid"/>
+          </a:ln>
+          <a:effectLst/>
+        </p:spPr>
+        <p:style>
+          <a:lnRef idx="1">
+            <a:schemeClr val="accent1"/>
+          </a:lnRef>
+          <a:fillRef idx="3">
+            <a:schemeClr val="accent1"/>
+          </a:fillRef>
+          <a:effectRef idx="2">
+            <a:schemeClr val="accent1"/>
+          </a:effectRef>
+          <a:fontRef idx="minor">
+            <a:schemeClr val="lt1"/>
+          </a:fontRef>
+        </p:style>
+        <p:txBody>
+          <a:bodyPr rtlCol="0" anchor="ctr"/>
+          <a:lstStyle/>
+          <a:p>
+            <a:pPr algn="ctr"/>
+            <a:endParaRPr kumimoji="1" lang="en-US" altLang="zh-TW" dirty="0" smtClean="0"/>
+          </a:p>
+          <a:p>
+            <a:pPr algn="ctr"/>
+            <a:endParaRPr kumimoji="1" lang="zh-TW" altLang="en-US" dirty="0"/>
+          </a:p>
+        </p:txBody>
+      </p:sp>
+    </p:spTree>
+    <p:extLst>
+      <p:ext uri="{BB962C8B-B14F-4D97-AF65-F5344CB8AC3E}">
+        <p14:creationId xmlns:p14="http://schemas.microsoft.com/office/powerpoint/2010/main" val="3281220666"/>
+      </p:ext>
+    </p:extLst>
+  </p:cSld>
+  <p:clrMapOvr>
+    <a:masterClrMapping/>
+  </p:clrMapOvr>
+  <p:timing>
+    <p:tnLst>
+      <p:par>
+        <p:cTn xmlns:p14="http://schemas.microsoft.com/office/powerpoint/2010/main" id="1" dur="indefinite" restart="never" nodeType="tmRoot"/>
+      </p:par>
+    </p:tnLst>
+  </p:timing>
+</p:sld>
+</file>
+
+<file path=ppt/slides/slide28.xml><?xml version="1.0" encoding="utf-8"?>
+<p:sld xmlns:a="http://schemas.openxmlformats.org/drawingml/2006/main" xmlns:r="http://schemas.openxmlformats.org/officeDocument/2006/relationships" xmlns:p="http://schemas.openxmlformats.org/presentationml/2006/main">
+  <p:cSld>
+    <p:spTree>
+      <p:nvGrpSpPr>
+        <p:cNvPr id="1" name=""/>
+        <p:cNvGrpSpPr/>
+        <p:nvPr/>
+      </p:nvGrpSpPr>
+      <p:grpSpPr>
+        <a:xfrm>
+          <a:off x="0" y="0"/>
+          <a:ext cx="0" cy="0"/>
+          <a:chOff x="0" y="0"/>
+          <a:chExt cx="0" cy="0"/>
+        </a:xfrm>
+      </p:grpSpPr>
+      <p:sp>
+        <p:nvSpPr>
+          <p:cNvPr id="2" name="標題 1"/>
+          <p:cNvSpPr>
+            <a:spLocks noGrp="1"/>
+          </p:cNvSpPr>
+          <p:nvPr>
+            <p:ph type="title"/>
+          </p:nvPr>
+        </p:nvSpPr>
+        <p:spPr>
+          <a:xfrm>
+            <a:off x="0" y="-6513"/>
+            <a:ext cx="9144000" cy="650968"/>
+          </a:xfrm>
+        </p:spPr>
+        <p:txBody>
+          <a:bodyPr/>
+          <a:lstStyle/>
+          <a:p>
+            <a:r>
+              <a:rPr lang="en-US" altLang="zh-TW" dirty="0" smtClean="0"/>
+              <a:t>Closure </a:t>
+            </a:r>
+            <a:r>
+              <a:rPr lang="zh-TW" altLang="en-US" dirty="0" smtClean="0"/>
+              <a:t>設計要點：</a:t>
+            </a:r>
+            <a:r>
+              <a:rPr lang="zh-TW" altLang="en-US" dirty="0" smtClean="0"/>
+              <a:t>用在傳遞參數時</a:t>
+            </a:r>
+            <a:endParaRPr lang="zh-TW" altLang="en-US" dirty="0"/>
+          </a:p>
+        </p:txBody>
+      </p:sp>
+      <p:sp>
+        <p:nvSpPr>
+          <p:cNvPr id="3" name="內容版面配置區 2"/>
+          <p:cNvSpPr>
+            <a:spLocks noGrp="1"/>
+          </p:cNvSpPr>
+          <p:nvPr>
+            <p:ph idx="1"/>
+          </p:nvPr>
+        </p:nvSpPr>
+        <p:spPr>
+          <a:xfrm>
+            <a:off x="229251" y="748705"/>
+            <a:ext cx="8693313" cy="6019470"/>
+          </a:xfrm>
+        </p:spPr>
+        <p:txBody>
+          <a:bodyPr>
+            <a:normAutofit fontScale="85000" lnSpcReduction="10000"/>
+          </a:bodyPr>
+          <a:lstStyle/>
+          <a:p>
+            <a:r>
+              <a:rPr lang="en-US" altLang="zh-TW" dirty="0" smtClean="0">
+                <a:sym typeface="Wingdings" panose="05000000000000000000" pitchFamily="2" charset="2"/>
+              </a:rPr>
+              <a:t>“</a:t>
+            </a:r>
+            <a:r>
+              <a:rPr lang="zh-TW" altLang="en-US" dirty="0" smtClean="0">
+                <a:sym typeface="Wingdings" panose="05000000000000000000" pitchFamily="2" charset="2"/>
+              </a:rPr>
+              <a:t>呼叫函式</a:t>
+            </a:r>
+            <a:r>
+              <a:rPr lang="en-US" altLang="zh-TW" dirty="0" smtClean="0">
+                <a:sym typeface="Wingdings" panose="05000000000000000000" pitchFamily="2" charset="2"/>
+              </a:rPr>
+              <a:t>”</a:t>
+            </a:r>
+            <a:r>
+              <a:rPr lang="en-US" altLang="zh-TW" dirty="0" smtClean="0">
+                <a:sym typeface="Wingdings" panose="05000000000000000000" pitchFamily="2" charset="2"/>
+              </a:rPr>
+              <a:t>:</a:t>
+            </a:r>
+            <a:r>
+              <a:rPr lang="zh-TW" altLang="en-US" dirty="0">
+                <a:sym typeface="Wingdings" panose="05000000000000000000" pitchFamily="2" charset="2"/>
+              </a:rPr>
+              <a:t>參數設計為一個</a:t>
+            </a:r>
+            <a:r>
+              <a:rPr lang="en-US" altLang="zh-TW" dirty="0">
+                <a:sym typeface="Wingdings" panose="05000000000000000000" pitchFamily="2" charset="2"/>
+              </a:rPr>
+              <a:t> </a:t>
+            </a:r>
+            <a:r>
+              <a:rPr lang="en-US" altLang="zh-TW" dirty="0" smtClean="0">
+                <a:sym typeface="Wingdings" panose="05000000000000000000" pitchFamily="2" charset="2"/>
+              </a:rPr>
+              <a:t>closure </a:t>
+            </a:r>
+            <a:r>
+              <a:rPr lang="en-US" altLang="zh-TW" b="1" dirty="0" smtClean="0">
+                <a:solidFill>
+                  <a:srgbClr val="FF0000"/>
+                </a:solidFill>
+                <a:sym typeface="Wingdings" panose="05000000000000000000" pitchFamily="2" charset="2"/>
+              </a:rPr>
+              <a:t>{</a:t>
+            </a:r>
+            <a:r>
+              <a:rPr lang="mr-IN" altLang="zh-TW" b="1" dirty="0" smtClean="0">
+                <a:solidFill>
+                  <a:srgbClr val="FF0000"/>
+                </a:solidFill>
+                <a:sym typeface="Wingdings" panose="05000000000000000000" pitchFamily="2" charset="2"/>
+              </a:rPr>
+              <a:t>…</a:t>
+            </a:r>
+            <a:r>
+              <a:rPr lang="en-US" altLang="zh-TW" b="1" dirty="0" smtClean="0">
+                <a:solidFill>
+                  <a:srgbClr val="FF0000"/>
+                </a:solidFill>
+                <a:sym typeface="Wingdings" panose="05000000000000000000" pitchFamily="2" charset="2"/>
+              </a:rPr>
+              <a:t>.}</a:t>
+            </a:r>
+            <a:r>
+              <a:rPr lang="en-US" altLang="zh-TW" dirty="0" smtClean="0">
+                <a:sym typeface="Wingdings" panose="05000000000000000000" pitchFamily="2" charset="2"/>
+              </a:rPr>
+              <a:t>, </a:t>
+            </a:r>
+            <a:r>
+              <a:rPr lang="zh-TW" altLang="en-US" dirty="0" smtClean="0">
+                <a:sym typeface="Wingdings" panose="05000000000000000000" pitchFamily="2" charset="2"/>
+              </a:rPr>
+              <a:t>傳一包程式碼出去</a:t>
+            </a:r>
+            <a:r>
+              <a:rPr lang="en-US" altLang="zh-TW" dirty="0" smtClean="0">
+                <a:sym typeface="Wingdings" panose="05000000000000000000" pitchFamily="2" charset="2"/>
+              </a:rPr>
+              <a:t>,</a:t>
+            </a:r>
+            <a:r>
+              <a:rPr lang="zh-TW" altLang="en-US" dirty="0" smtClean="0">
+                <a:sym typeface="Wingdings" panose="05000000000000000000" pitchFamily="2" charset="2"/>
+              </a:rPr>
+              <a:t>再拉回</a:t>
+            </a:r>
+            <a:r>
+              <a:rPr lang="en-US" altLang="zh-TW" dirty="0" smtClean="0">
+                <a:sym typeface="Wingdings" panose="05000000000000000000" pitchFamily="2" charset="2"/>
+              </a:rPr>
+              <a:t>.</a:t>
+            </a:r>
+          </a:p>
+          <a:p>
+            <a:pPr marL="457200" lvl="1" indent="0">
+              <a:buNone/>
+            </a:pPr>
+            <a:r>
+              <a:rPr lang="en-US" altLang="zh-TW" dirty="0" err="1">
+                <a:sym typeface="Wingdings" panose="05000000000000000000" pitchFamily="2" charset="2"/>
+              </a:rPr>
+              <a:t>f</a:t>
+            </a:r>
+            <a:r>
+              <a:rPr lang="en-US" altLang="zh-TW" dirty="0" err="1" smtClean="0">
+                <a:sym typeface="Wingdings" panose="05000000000000000000" pitchFamily="2" charset="2"/>
+              </a:rPr>
+              <a:t>unc</a:t>
+            </a:r>
+            <a:r>
+              <a:rPr lang="en-US" altLang="zh-TW" dirty="0" smtClean="0">
+                <a:sym typeface="Wingdings" panose="05000000000000000000" pitchFamily="2" charset="2"/>
+              </a:rPr>
+              <a:t> </a:t>
+            </a:r>
+            <a:r>
+              <a:rPr lang="en-US" altLang="zh-TW" dirty="0" err="1" smtClean="0">
+                <a:sym typeface="Wingdings" panose="05000000000000000000" pitchFamily="2" charset="2"/>
+              </a:rPr>
+              <a:t>xxx.abc</a:t>
+            </a:r>
+            <a:r>
+              <a:rPr lang="en-US" altLang="zh-TW" dirty="0" smtClean="0">
+                <a:sym typeface="Wingdings" panose="05000000000000000000" pitchFamily="2" charset="2"/>
+              </a:rPr>
+              <a:t>( </a:t>
+            </a:r>
+            <a:r>
+              <a:rPr lang="en-US" altLang="zh-TW" dirty="0" err="1">
+                <a:solidFill>
+                  <a:srgbClr val="000000"/>
+                </a:solidFill>
+                <a:sym typeface="Wingdings" panose="05000000000000000000" pitchFamily="2" charset="2"/>
+              </a:rPr>
+              <a:t>completionhandler</a:t>
+            </a:r>
+            <a:r>
+              <a:rPr lang="en-US" altLang="zh-TW" dirty="0">
+                <a:solidFill>
+                  <a:srgbClr val="000000"/>
+                </a:solidFill>
+                <a:sym typeface="Wingdings" panose="05000000000000000000" pitchFamily="2" charset="2"/>
+              </a:rPr>
+              <a:t>:</a:t>
+            </a:r>
+            <a:r>
+              <a:rPr lang="en-US" altLang="zh-TW" b="1" dirty="0">
+                <a:solidFill>
+                  <a:srgbClr val="FF0000"/>
+                </a:solidFill>
+                <a:sym typeface="Wingdings" panose="05000000000000000000" pitchFamily="2" charset="2"/>
+              </a:rPr>
+              <a:t> </a:t>
+            </a:r>
+            <a:r>
+              <a:rPr lang="en-US" altLang="zh-TW" b="1" dirty="0" smtClean="0">
+                <a:solidFill>
+                  <a:srgbClr val="FF0000"/>
+                </a:solidFill>
+                <a:sym typeface="Wingdings" panose="05000000000000000000" pitchFamily="2" charset="2"/>
+              </a:rPr>
+              <a:t>{ ( </a:t>
+            </a:r>
+            <a:r>
+              <a:rPr lang="en-US" altLang="zh-TW" b="1" dirty="0" err="1">
+                <a:solidFill>
+                  <a:srgbClr val="FF0000"/>
+                </a:solidFill>
+                <a:sym typeface="Wingdings" panose="05000000000000000000" pitchFamily="2" charset="2"/>
+              </a:rPr>
+              <a:t>CLLocation</a:t>
+            </a:r>
+            <a:r>
+              <a:rPr lang="en-US" altLang="zh-TW" b="1" dirty="0">
+                <a:solidFill>
+                  <a:srgbClr val="FF0000"/>
+                </a:solidFill>
+                <a:sym typeface="Wingdings" panose="05000000000000000000" pitchFamily="2" charset="2"/>
+              </a:rPr>
+              <a:t> </a:t>
+            </a:r>
+            <a:r>
+              <a:rPr lang="en-US" altLang="zh-TW" b="1" dirty="0" smtClean="0">
+                <a:solidFill>
+                  <a:srgbClr val="FF0000"/>
+                </a:solidFill>
+                <a:sym typeface="Wingdings" panose="05000000000000000000" pitchFamily="2" charset="2"/>
+              </a:rPr>
+              <a:t>)  </a:t>
+            </a:r>
+            <a:r>
+              <a:rPr lang="en-US" altLang="zh-TW" u="sng" dirty="0" smtClean="0">
+                <a:solidFill>
+                  <a:srgbClr val="FF0000"/>
+                </a:solidFill>
+                <a:sym typeface="Wingdings" panose="05000000000000000000" pitchFamily="2" charset="2"/>
+              </a:rPr>
+              <a:t>in</a:t>
+            </a:r>
+            <a:endParaRPr lang="en-US" altLang="zh-TW" u="sng" dirty="0">
+              <a:solidFill>
+                <a:srgbClr val="FF0000"/>
+              </a:solidFill>
+              <a:sym typeface="Wingdings" panose="05000000000000000000" pitchFamily="2" charset="2"/>
+            </a:endParaRPr>
+          </a:p>
+          <a:p>
+            <a:pPr marL="457200" lvl="1" indent="0">
+              <a:buNone/>
+            </a:pPr>
+            <a:r>
+              <a:rPr lang="en-US" altLang="zh-TW" dirty="0">
+                <a:solidFill>
+                  <a:srgbClr val="FF0000"/>
+                </a:solidFill>
+                <a:sym typeface="Wingdings" panose="05000000000000000000" pitchFamily="2" charset="2"/>
+              </a:rPr>
+              <a:t>code</a:t>
+            </a:r>
+          </a:p>
+          <a:p>
+            <a:pPr marL="457200" lvl="1" indent="0">
+              <a:buNone/>
+            </a:pPr>
+            <a:r>
+              <a:rPr lang="en-US" altLang="zh-TW" b="1" dirty="0">
+                <a:solidFill>
+                  <a:srgbClr val="FF0000"/>
+                </a:solidFill>
+                <a:sym typeface="Wingdings" panose="05000000000000000000" pitchFamily="2" charset="2"/>
+              </a:rPr>
+              <a:t>}  </a:t>
+            </a:r>
+            <a:r>
+              <a:rPr lang="en-US" altLang="zh-TW" dirty="0" smtClean="0">
+                <a:solidFill>
+                  <a:srgbClr val="000000"/>
+                </a:solidFill>
+                <a:sym typeface="Wingdings" panose="05000000000000000000" pitchFamily="2" charset="2"/>
+              </a:rPr>
+              <a:t>)</a:t>
+            </a:r>
+          </a:p>
+          <a:p>
+            <a:pPr marL="457200" lvl="1" indent="0">
+              <a:buNone/>
+            </a:pPr>
+            <a:r>
+              <a:rPr lang="zh-TW" altLang="en-US" dirty="0" smtClean="0">
+                <a:solidFill>
+                  <a:srgbClr val="000000"/>
+                </a:solidFill>
+                <a:sym typeface="Wingdings" panose="05000000000000000000" pitchFamily="2" charset="2"/>
+              </a:rPr>
+              <a:t>以及</a:t>
+            </a:r>
+            <a:endParaRPr lang="en-US" altLang="zh-TW" dirty="0" smtClean="0">
+              <a:solidFill>
+                <a:srgbClr val="000000"/>
+              </a:solidFill>
+              <a:sym typeface="Wingdings" panose="05000000000000000000" pitchFamily="2" charset="2"/>
+            </a:endParaRPr>
+          </a:p>
+          <a:p>
+            <a:pPr marL="457200" lvl="1" indent="0">
+              <a:buNone/>
+            </a:pPr>
+            <a:r>
+              <a:rPr lang="en-US" altLang="zh-TW" dirty="0" err="1" smtClean="0">
+                <a:sym typeface="Wingdings" panose="05000000000000000000" pitchFamily="2" charset="2"/>
+              </a:rPr>
+              <a:t>func</a:t>
+            </a:r>
+            <a:r>
+              <a:rPr lang="en-US" altLang="zh-TW" dirty="0" smtClean="0">
+                <a:sym typeface="Wingdings" panose="05000000000000000000" pitchFamily="2" charset="2"/>
+              </a:rPr>
+              <a:t> </a:t>
+            </a:r>
+            <a:r>
+              <a:rPr lang="en-US" altLang="zh-TW" dirty="0" err="1" smtClean="0">
+                <a:sym typeface="Wingdings" panose="05000000000000000000" pitchFamily="2" charset="2"/>
+              </a:rPr>
+              <a:t>xxx.abc</a:t>
+            </a:r>
+            <a:r>
+              <a:rPr lang="en-US" altLang="zh-TW" b="1" dirty="0" smtClean="0">
+                <a:solidFill>
+                  <a:srgbClr val="FF0000"/>
+                </a:solidFill>
+                <a:sym typeface="Wingdings" panose="05000000000000000000" pitchFamily="2" charset="2"/>
+              </a:rPr>
+              <a:t> </a:t>
+            </a:r>
+            <a:r>
+              <a:rPr lang="en-US" altLang="zh-TW" b="1" dirty="0">
+                <a:solidFill>
+                  <a:srgbClr val="FF0000"/>
+                </a:solidFill>
+                <a:sym typeface="Wingdings" panose="05000000000000000000" pitchFamily="2" charset="2"/>
+              </a:rPr>
+              <a:t>{ ( </a:t>
+            </a:r>
+            <a:r>
+              <a:rPr lang="en-US" altLang="zh-TW" b="1" dirty="0" err="1">
+                <a:solidFill>
+                  <a:srgbClr val="FF0000"/>
+                </a:solidFill>
+                <a:sym typeface="Wingdings" panose="05000000000000000000" pitchFamily="2" charset="2"/>
+              </a:rPr>
+              <a:t>CLLocation</a:t>
+            </a:r>
+            <a:r>
+              <a:rPr lang="en-US" altLang="zh-TW" b="1" dirty="0">
+                <a:solidFill>
+                  <a:srgbClr val="FF0000"/>
+                </a:solidFill>
+                <a:sym typeface="Wingdings" panose="05000000000000000000" pitchFamily="2" charset="2"/>
+              </a:rPr>
+              <a:t> )  in</a:t>
+            </a:r>
+          </a:p>
+          <a:p>
+            <a:pPr marL="457200" lvl="1" indent="0">
+              <a:buNone/>
+            </a:pPr>
+            <a:r>
+              <a:rPr lang="en-US" altLang="zh-TW" b="1" dirty="0">
+                <a:solidFill>
+                  <a:srgbClr val="FF0000"/>
+                </a:solidFill>
+                <a:sym typeface="Wingdings" panose="05000000000000000000" pitchFamily="2" charset="2"/>
+              </a:rPr>
+              <a:t>code</a:t>
+            </a:r>
+          </a:p>
+          <a:p>
+            <a:pPr marL="457200" lvl="1" indent="0">
+              <a:buNone/>
+            </a:pPr>
+            <a:r>
+              <a:rPr lang="en-US" altLang="zh-TW" b="1" dirty="0">
+                <a:solidFill>
+                  <a:srgbClr val="FF0000"/>
+                </a:solidFill>
+                <a:sym typeface="Wingdings" panose="05000000000000000000" pitchFamily="2" charset="2"/>
+              </a:rPr>
+              <a:t>} </a:t>
+            </a:r>
+            <a:endParaRPr lang="en-US" altLang="zh-TW" dirty="0">
+              <a:solidFill>
+                <a:srgbClr val="000000"/>
+              </a:solidFill>
+              <a:sym typeface="Wingdings" panose="05000000000000000000" pitchFamily="2" charset="2"/>
+            </a:endParaRPr>
+          </a:p>
+          <a:p>
+            <a:r>
+              <a:rPr lang="en-US" altLang="zh-TW" b="1" u="sng" dirty="0" smtClean="0">
+                <a:solidFill>
+                  <a:srgbClr val="0000FF"/>
+                </a:solidFill>
+                <a:sym typeface="Wingdings" panose="05000000000000000000" pitchFamily="2" charset="2"/>
+              </a:rPr>
+              <a:t>“</a:t>
+            </a:r>
+            <a:r>
+              <a:rPr lang="zh-TW" altLang="en-US" b="1" u="sng" dirty="0" smtClean="0">
+                <a:solidFill>
+                  <a:srgbClr val="0000FF"/>
+                </a:solidFill>
+                <a:sym typeface="Wingdings" panose="05000000000000000000" pitchFamily="2" charset="2"/>
+              </a:rPr>
+              <a:t>被呼叫函式</a:t>
+            </a:r>
+            <a:r>
+              <a:rPr lang="en-US" altLang="zh-TW" b="1" u="sng" dirty="0" smtClean="0">
+                <a:solidFill>
+                  <a:srgbClr val="0000FF"/>
+                </a:solidFill>
+                <a:sym typeface="Wingdings" panose="05000000000000000000" pitchFamily="2" charset="2"/>
+              </a:rPr>
+              <a:t>” </a:t>
+            </a:r>
+            <a:r>
+              <a:rPr lang="en-US" altLang="zh-TW" dirty="0" smtClean="0">
+                <a:sym typeface="Wingdings" panose="05000000000000000000" pitchFamily="2" charset="2"/>
+              </a:rPr>
+              <a:t>: </a:t>
+            </a:r>
+            <a:r>
+              <a:rPr lang="zh-TW" altLang="en-US" dirty="0" smtClean="0">
+                <a:sym typeface="Wingdings" panose="05000000000000000000" pitchFamily="2" charset="2"/>
+              </a:rPr>
+              <a:t>參數設計為一個</a:t>
+            </a:r>
+            <a:r>
+              <a:rPr lang="en-US" altLang="zh-TW" dirty="0" smtClean="0">
+                <a:sym typeface="Wingdings" panose="05000000000000000000" pitchFamily="2" charset="2"/>
+              </a:rPr>
+              <a:t> closure, </a:t>
+            </a:r>
+            <a:r>
+              <a:rPr lang="zh-TW" altLang="en-US" dirty="0" smtClean="0">
+                <a:sym typeface="Wingdings" panose="05000000000000000000" pitchFamily="2" charset="2"/>
+              </a:rPr>
+              <a:t>在小括弧的參數空格區填入</a:t>
+            </a:r>
+            <a:r>
+              <a:rPr lang="en-US" altLang="zh-TW" dirty="0" smtClean="0">
+                <a:sym typeface="Wingdings" panose="05000000000000000000" pitchFamily="2" charset="2"/>
+              </a:rPr>
+              <a:t>(</a:t>
+            </a:r>
+            <a:r>
+              <a:rPr lang="zh-TW" altLang="en-US" dirty="0" smtClean="0">
+                <a:sym typeface="Wingdings" panose="05000000000000000000" pitchFamily="2" charset="2"/>
+              </a:rPr>
+              <a:t>參數名</a:t>
+            </a:r>
+            <a:r>
+              <a:rPr lang="en-US" altLang="zh-TW" dirty="0" smtClean="0">
+                <a:sym typeface="Wingdings" panose="05000000000000000000" pitchFamily="2" charset="2"/>
+              </a:rPr>
+              <a:t>: </a:t>
+            </a:r>
+            <a:r>
+              <a:rPr lang="zh-TW" altLang="en-US" b="1" dirty="0" smtClean="0">
+                <a:solidFill>
+                  <a:srgbClr val="FF0000"/>
+                </a:solidFill>
+                <a:sym typeface="Wingdings" panose="05000000000000000000" pitchFamily="2" charset="2"/>
+              </a:rPr>
+              <a:t>資料類別</a:t>
+            </a:r>
+            <a:r>
+              <a:rPr lang="en-US" altLang="zh-TW" dirty="0" smtClean="0">
+                <a:sym typeface="Wingdings" panose="05000000000000000000" pitchFamily="2" charset="2"/>
+              </a:rPr>
+              <a:t>), </a:t>
+            </a:r>
+            <a:r>
+              <a:rPr lang="zh-TW" altLang="en-US" dirty="0" smtClean="0">
+                <a:sym typeface="Wingdings" panose="05000000000000000000" pitchFamily="2" charset="2"/>
+              </a:rPr>
+              <a:t>型態如下</a:t>
+            </a:r>
+            <a:r>
+              <a:rPr lang="en-US" altLang="zh-TW" dirty="0" smtClean="0">
+                <a:sym typeface="Wingdings" panose="05000000000000000000" pitchFamily="2" charset="2"/>
+              </a:rPr>
+              <a:t>. </a:t>
+            </a:r>
+            <a:r>
+              <a:rPr lang="zh-TW" altLang="en-US" dirty="0" smtClean="0">
+                <a:sym typeface="Wingdings" panose="05000000000000000000" pitchFamily="2" charset="2"/>
+              </a:rPr>
+              <a:t>在被呼叫當下</a:t>
+            </a:r>
+            <a:r>
+              <a:rPr lang="en-US" altLang="zh-TW" dirty="0" smtClean="0">
+                <a:sym typeface="Wingdings" panose="05000000000000000000" pitchFamily="2" charset="2"/>
+              </a:rPr>
+              <a:t>, </a:t>
+            </a:r>
+            <a:r>
+              <a:rPr lang="zh-TW" altLang="en-US" dirty="0" smtClean="0">
+                <a:sym typeface="Wingdings" panose="05000000000000000000" pitchFamily="2" charset="2"/>
+              </a:rPr>
+              <a:t>參數值待定</a:t>
+            </a:r>
+            <a:r>
+              <a:rPr lang="en-US" altLang="zh-TW" dirty="0" smtClean="0">
+                <a:sym typeface="Wingdings" panose="05000000000000000000" pitchFamily="2" charset="2"/>
+              </a:rPr>
+              <a:t>!</a:t>
+            </a:r>
+          </a:p>
+          <a:p>
+            <a:pPr marL="457200" lvl="1" indent="0">
+              <a:buNone/>
+            </a:pPr>
+            <a:r>
+              <a:rPr lang="en-US" altLang="zh-TW" dirty="0" err="1" smtClean="0">
+                <a:sym typeface="Wingdings" panose="05000000000000000000" pitchFamily="2" charset="2"/>
+              </a:rPr>
+              <a:t>func</a:t>
+            </a:r>
+            <a:r>
+              <a:rPr lang="en-US" altLang="zh-TW" dirty="0" smtClean="0">
+                <a:sym typeface="Wingdings" panose="05000000000000000000" pitchFamily="2" charset="2"/>
+              </a:rPr>
+              <a:t> </a:t>
+            </a:r>
+            <a:r>
+              <a:rPr lang="en-US" altLang="zh-TW" dirty="0" err="1" smtClean="0">
+                <a:sym typeface="Wingdings" panose="05000000000000000000" pitchFamily="2" charset="2"/>
+              </a:rPr>
+              <a:t>abc</a:t>
+            </a:r>
+            <a:r>
+              <a:rPr lang="en-US" altLang="zh-TW" dirty="0" smtClean="0">
+                <a:sym typeface="Wingdings" panose="05000000000000000000" pitchFamily="2" charset="2"/>
+              </a:rPr>
+              <a:t>( </a:t>
+            </a:r>
+            <a:r>
+              <a:rPr lang="en-US" altLang="zh-TW" dirty="0" err="1" smtClean="0">
+                <a:solidFill>
+                  <a:srgbClr val="000000"/>
+                </a:solidFill>
+                <a:sym typeface="Wingdings" panose="05000000000000000000" pitchFamily="2" charset="2"/>
+              </a:rPr>
+              <a:t>completionhandler</a:t>
+            </a:r>
+            <a:r>
+              <a:rPr lang="en-US" altLang="zh-TW" b="1" dirty="0" smtClean="0">
+                <a:solidFill>
+                  <a:srgbClr val="000000"/>
+                </a:solidFill>
+                <a:sym typeface="Wingdings" panose="05000000000000000000" pitchFamily="2" charset="2"/>
+              </a:rPr>
+              <a:t>: </a:t>
+            </a:r>
+            <a:r>
+              <a:rPr lang="en-US" altLang="zh-TW" b="1" dirty="0" smtClean="0">
+                <a:solidFill>
+                  <a:srgbClr val="FF0000"/>
+                </a:solidFill>
+                <a:sym typeface="Wingdings" panose="05000000000000000000" pitchFamily="2" charset="2"/>
+              </a:rPr>
+              <a:t>( </a:t>
+            </a:r>
+            <a:r>
+              <a:rPr lang="en-US" altLang="zh-TW" b="1" dirty="0" err="1" smtClean="0">
+                <a:solidFill>
+                  <a:srgbClr val="FF0000"/>
+                </a:solidFill>
+                <a:sym typeface="Wingdings" panose="05000000000000000000" pitchFamily="2" charset="2"/>
+              </a:rPr>
+              <a:t>CLLocation</a:t>
+            </a:r>
+            <a:r>
+              <a:rPr lang="en-US" altLang="zh-TW" b="1" dirty="0" smtClean="0">
+                <a:solidFill>
+                  <a:srgbClr val="FF0000"/>
+                </a:solidFill>
+                <a:sym typeface="Wingdings" panose="05000000000000000000" pitchFamily="2" charset="2"/>
+              </a:rPr>
+              <a:t> ) -&gt;  Void </a:t>
+            </a:r>
+            <a:r>
+              <a:rPr lang="en-US" altLang="zh-TW" dirty="0" smtClean="0">
+                <a:sym typeface="Wingdings" panose="05000000000000000000" pitchFamily="2" charset="2"/>
+              </a:rPr>
+              <a:t>)</a:t>
+            </a:r>
+            <a:r>
+              <a:rPr lang="en-US" altLang="zh-TW" b="1" dirty="0" smtClean="0">
+                <a:solidFill>
+                  <a:srgbClr val="FF0000"/>
+                </a:solidFill>
+                <a:sym typeface="Wingdings" panose="05000000000000000000" pitchFamily="2" charset="2"/>
+              </a:rPr>
+              <a:t> </a:t>
+            </a:r>
+            <a:r>
+              <a:rPr lang="en-US" altLang="zh-TW" dirty="0" smtClean="0">
+                <a:sym typeface="Wingdings" panose="05000000000000000000" pitchFamily="2" charset="2"/>
+              </a:rPr>
+              <a:t> {</a:t>
+            </a:r>
+          </a:p>
+          <a:p>
+            <a:pPr marL="457200" lvl="1" indent="0">
+              <a:buNone/>
+            </a:pPr>
+            <a:r>
+              <a:rPr lang="en-US" altLang="zh-TW" dirty="0" smtClean="0">
+                <a:sym typeface="Wingdings" panose="05000000000000000000" pitchFamily="2" charset="2"/>
+              </a:rPr>
+              <a:t>code</a:t>
+            </a:r>
+          </a:p>
+          <a:p>
+            <a:pPr marL="457200" lvl="1" indent="0">
+              <a:buNone/>
+            </a:pPr>
+            <a:r>
+              <a:rPr lang="en-US" altLang="zh-TW" dirty="0" smtClean="0">
+                <a:sym typeface="Wingdings" panose="05000000000000000000" pitchFamily="2" charset="2"/>
+              </a:rPr>
+              <a:t>}  </a:t>
+            </a:r>
+          </a:p>
+          <a:p>
+            <a:r>
+              <a:rPr lang="en-US" altLang="zh-TW" b="1" u="sng" dirty="0" smtClean="0">
+                <a:solidFill>
+                  <a:srgbClr val="0000FF"/>
+                </a:solidFill>
+                <a:sym typeface="Wingdings" panose="05000000000000000000" pitchFamily="2" charset="2"/>
+              </a:rPr>
+              <a:t>“</a:t>
+            </a:r>
+            <a:r>
+              <a:rPr lang="zh-TW" altLang="en-US" b="1" u="sng" dirty="0" smtClean="0">
+                <a:solidFill>
+                  <a:srgbClr val="0000FF"/>
+                </a:solidFill>
+                <a:sym typeface="Wingdings" panose="05000000000000000000" pitchFamily="2" charset="2"/>
+              </a:rPr>
+              <a:t>被呼叫函式</a:t>
+            </a:r>
+            <a:r>
+              <a:rPr lang="en-US" altLang="zh-TW" b="1" u="sng" dirty="0" smtClean="0">
+                <a:solidFill>
+                  <a:srgbClr val="0000FF"/>
+                </a:solidFill>
+                <a:sym typeface="Wingdings" panose="05000000000000000000" pitchFamily="2" charset="2"/>
+              </a:rPr>
+              <a:t>”</a:t>
+            </a:r>
+            <a:r>
+              <a:rPr lang="en-US" altLang="zh-TW" dirty="0" smtClean="0">
+                <a:sym typeface="Wingdings" panose="05000000000000000000" pitchFamily="2" charset="2"/>
+              </a:rPr>
+              <a:t>:</a:t>
+            </a:r>
+            <a:r>
+              <a:rPr lang="zh-TW" altLang="en-US" dirty="0">
+                <a:sym typeface="Wingdings" panose="05000000000000000000" pitchFamily="2" charset="2"/>
+              </a:rPr>
+              <a:t>參數設計為一個</a:t>
+            </a:r>
+            <a:r>
+              <a:rPr lang="en-US" altLang="zh-TW" dirty="0">
+                <a:sym typeface="Wingdings" panose="05000000000000000000" pitchFamily="2" charset="2"/>
+              </a:rPr>
+              <a:t> </a:t>
+            </a:r>
+            <a:r>
+              <a:rPr lang="en-US" altLang="zh-TW" dirty="0" smtClean="0">
+                <a:sym typeface="Wingdings" panose="05000000000000000000" pitchFamily="2" charset="2"/>
+              </a:rPr>
+              <a:t>closure, </a:t>
+            </a:r>
+            <a:r>
+              <a:rPr lang="zh-TW" altLang="en-US" dirty="0" smtClean="0">
+                <a:sym typeface="Wingdings" panose="05000000000000000000" pitchFamily="2" charset="2"/>
+              </a:rPr>
+              <a:t>型態同</a:t>
+            </a:r>
+            <a:r>
+              <a:rPr lang="zh-TW" altLang="en-US" dirty="0">
+                <a:sym typeface="Wingdings" panose="05000000000000000000" pitchFamily="2" charset="2"/>
+              </a:rPr>
+              <a:t>呼叫函式</a:t>
+            </a:r>
+            <a:r>
+              <a:rPr lang="en-US" altLang="zh-TW" dirty="0" smtClean="0">
+                <a:sym typeface="Wingdings" panose="05000000000000000000" pitchFamily="2" charset="2"/>
+              </a:rPr>
+              <a:t>, </a:t>
+            </a:r>
+            <a:r>
+              <a:rPr lang="zh-TW" altLang="en-US" dirty="0" smtClean="0">
+                <a:sym typeface="Wingdings" panose="05000000000000000000" pitchFamily="2" charset="2"/>
+              </a:rPr>
+              <a:t>參數輸入及回傳值以這裡為主體規劃之</a:t>
+            </a:r>
+            <a:r>
+              <a:rPr lang="en-US" altLang="zh-TW" dirty="0" smtClean="0">
+                <a:sym typeface="Wingdings" panose="05000000000000000000" pitchFamily="2" charset="2"/>
+              </a:rPr>
+              <a:t>. </a:t>
+            </a:r>
+          </a:p>
+          <a:p>
+            <a:r>
+              <a:rPr lang="zh-TW" altLang="en-US" dirty="0" smtClean="0">
+                <a:sym typeface="Wingdings" panose="05000000000000000000" pitchFamily="2" charset="2"/>
+              </a:rPr>
+              <a:t>可以先規劃</a:t>
+            </a:r>
+            <a:r>
+              <a:rPr lang="en-US" altLang="zh-TW" b="1" u="sng" dirty="0" smtClean="0">
+                <a:solidFill>
+                  <a:srgbClr val="0000FF"/>
+                </a:solidFill>
+                <a:sym typeface="Wingdings" panose="05000000000000000000" pitchFamily="2" charset="2"/>
+              </a:rPr>
+              <a:t>”</a:t>
+            </a:r>
+            <a:r>
+              <a:rPr lang="zh-TW" altLang="en-US" b="1" u="sng" dirty="0">
+                <a:solidFill>
+                  <a:srgbClr val="0000FF"/>
+                </a:solidFill>
+                <a:sym typeface="Wingdings" panose="05000000000000000000" pitchFamily="2" charset="2"/>
+              </a:rPr>
+              <a:t>被</a:t>
+            </a:r>
+            <a:r>
+              <a:rPr lang="zh-TW" altLang="en-US" b="1" u="sng" dirty="0" smtClean="0">
+                <a:solidFill>
+                  <a:srgbClr val="0000FF"/>
+                </a:solidFill>
+                <a:sym typeface="Wingdings" panose="05000000000000000000" pitchFamily="2" charset="2"/>
+              </a:rPr>
+              <a:t>呼叫函式</a:t>
+            </a:r>
+            <a:r>
+              <a:rPr lang="en-US" altLang="zh-TW" b="1" u="sng" dirty="0" smtClean="0">
+                <a:solidFill>
+                  <a:srgbClr val="0000FF"/>
+                </a:solidFill>
+                <a:sym typeface="Wingdings" panose="05000000000000000000" pitchFamily="2" charset="2"/>
+              </a:rPr>
+              <a:t>”</a:t>
+            </a:r>
+            <a:r>
+              <a:rPr lang="en-US" altLang="zh-TW" dirty="0" smtClean="0">
+                <a:sym typeface="Wingdings" panose="05000000000000000000" pitchFamily="2" charset="2"/>
+              </a:rPr>
+              <a:t>, </a:t>
+            </a:r>
+            <a:r>
+              <a:rPr lang="zh-TW" altLang="en-US" dirty="0" smtClean="0">
+                <a:sym typeface="Wingdings" panose="05000000000000000000" pitchFamily="2" charset="2"/>
+              </a:rPr>
+              <a:t>然後</a:t>
+            </a:r>
+            <a:r>
+              <a:rPr lang="zh-TW" altLang="en-US" dirty="0">
+                <a:sym typeface="Wingdings" panose="05000000000000000000" pitchFamily="2" charset="2"/>
+              </a:rPr>
+              <a:t>規劃</a:t>
+            </a:r>
+            <a:r>
+              <a:rPr lang="en-US" altLang="zh-TW" dirty="0" smtClean="0">
+                <a:sym typeface="Wingdings" panose="05000000000000000000" pitchFamily="2" charset="2"/>
+              </a:rPr>
+              <a:t>”</a:t>
+            </a:r>
+            <a:r>
+              <a:rPr lang="zh-TW" altLang="en-US" dirty="0" smtClean="0">
+                <a:sym typeface="Wingdings" panose="05000000000000000000" pitchFamily="2" charset="2"/>
+              </a:rPr>
+              <a:t>呼叫函式</a:t>
+            </a:r>
+            <a:r>
+              <a:rPr lang="en-US" altLang="zh-TW" dirty="0" smtClean="0">
+                <a:sym typeface="Wingdings" panose="05000000000000000000" pitchFamily="2" charset="2"/>
+              </a:rPr>
+              <a:t>”,</a:t>
+            </a:r>
+            <a:r>
+              <a:rPr lang="zh-TW" altLang="en-US" dirty="0" smtClean="0">
+                <a:sym typeface="Wingdings" panose="05000000000000000000" pitchFamily="2" charset="2"/>
+              </a:rPr>
+              <a:t>反之也可以</a:t>
+            </a:r>
+            <a:r>
+              <a:rPr lang="en-US" altLang="zh-TW" dirty="0">
+                <a:sym typeface="Wingdings" panose="05000000000000000000" pitchFamily="2" charset="2"/>
+              </a:rPr>
+              <a:t>!</a:t>
+            </a:r>
+            <a:endParaRPr lang="en-US" altLang="zh-TW" dirty="0" smtClean="0">
+              <a:sym typeface="Wingdings" panose="05000000000000000000" pitchFamily="2" charset="2"/>
+            </a:endParaRPr>
+          </a:p>
+          <a:p>
+            <a:r>
+              <a:rPr lang="zh-TW" altLang="en-US" dirty="0" smtClean="0">
+                <a:sym typeface="Wingdings" panose="05000000000000000000" pitchFamily="2" charset="2"/>
+              </a:rPr>
+              <a:t>當</a:t>
+            </a:r>
+            <a:r>
+              <a:rPr lang="zh-TW" altLang="en-US" dirty="0" smtClean="0">
+                <a:sym typeface="Wingdings" panose="05000000000000000000" pitchFamily="2" charset="2"/>
+              </a:rPr>
+              <a:t>呼叫函式</a:t>
+            </a:r>
+            <a:r>
+              <a:rPr lang="zh-TW" altLang="en-US" dirty="0" smtClean="0">
+                <a:sym typeface="Wingdings" panose="05000000000000000000" pitchFamily="2" charset="2"/>
+              </a:rPr>
+              <a:t>最後一個參數是</a:t>
+            </a:r>
+            <a:r>
+              <a:rPr lang="en-US" altLang="zh-TW" dirty="0" smtClean="0">
+                <a:sym typeface="Wingdings" panose="05000000000000000000" pitchFamily="2" charset="2"/>
+              </a:rPr>
+              <a:t> closure </a:t>
+            </a:r>
+            <a:r>
+              <a:rPr lang="zh-TW" altLang="en-US" dirty="0" smtClean="0">
+                <a:sym typeface="Wingdings" panose="05000000000000000000" pitchFamily="2" charset="2"/>
+              </a:rPr>
+              <a:t>的時候</a:t>
+            </a:r>
+            <a:r>
+              <a:rPr lang="en-US" altLang="zh-TW" dirty="0" smtClean="0">
+                <a:sym typeface="Wingdings" panose="05000000000000000000" pitchFamily="2" charset="2"/>
+              </a:rPr>
+              <a:t>, </a:t>
+            </a:r>
+            <a:r>
+              <a:rPr lang="zh-TW" altLang="en-US" dirty="0" smtClean="0">
+                <a:sym typeface="Wingdings" panose="05000000000000000000" pitchFamily="2" charset="2"/>
+              </a:rPr>
+              <a:t>可以將參數名稱</a:t>
+            </a:r>
+            <a:r>
+              <a:rPr lang="en-US" altLang="zh-TW" dirty="0" smtClean="0">
+                <a:sym typeface="Wingdings" panose="05000000000000000000" pitchFamily="2" charset="2"/>
+              </a:rPr>
+              <a:t> Label </a:t>
+            </a:r>
+            <a:r>
+              <a:rPr lang="zh-TW" altLang="en-US" dirty="0" smtClean="0">
+                <a:sym typeface="Wingdings" panose="05000000000000000000" pitchFamily="2" charset="2"/>
+              </a:rPr>
+              <a:t>及前後兩個小括弧省略</a:t>
+            </a:r>
+            <a:r>
+              <a:rPr lang="en-US" altLang="zh-TW" dirty="0" smtClean="0">
+                <a:sym typeface="Wingdings" panose="05000000000000000000" pitchFamily="2" charset="2"/>
+              </a:rPr>
+              <a:t>. </a:t>
+            </a:r>
+            <a:r>
+              <a:rPr lang="zh-TW" altLang="en-US" dirty="0" smtClean="0">
+                <a:sym typeface="Wingdings" panose="05000000000000000000" pitchFamily="2" charset="2"/>
+              </a:rPr>
+              <a:t>使程式看起來更簡潔</a:t>
+            </a:r>
+            <a:r>
+              <a:rPr lang="en-US" altLang="zh-TW" dirty="0" smtClean="0">
+                <a:sym typeface="Wingdings" panose="05000000000000000000" pitchFamily="2" charset="2"/>
+              </a:rPr>
+              <a:t>.</a:t>
+            </a:r>
+            <a:endParaRPr lang="en-US" altLang="zh-TW" dirty="0" smtClean="0">
+              <a:sym typeface="Wingdings" panose="05000000000000000000" pitchFamily="2" charset="2"/>
+            </a:endParaRPr>
+          </a:p>
+        </p:txBody>
+      </p:sp>
+      <p:sp>
+        <p:nvSpPr>
+          <p:cNvPr id="10" name="矩形圖說文字 9"/>
+          <p:cNvSpPr/>
+          <p:nvPr/>
+        </p:nvSpPr>
+        <p:spPr>
+          <a:xfrm>
+            <a:off x="6187269" y="4572813"/>
+            <a:ext cx="2350410" cy="464389"/>
+          </a:xfrm>
+          <a:prstGeom prst="wedgeRectCallout">
+            <a:avLst>
+              <a:gd name="adj1" fmla="val -42736"/>
+              <a:gd name="adj2" fmla="val -94809"/>
+            </a:avLst>
+          </a:prstGeom>
+          <a:solidFill>
+            <a:srgbClr val="FFFF00"/>
+          </a:solidFill>
+          <a:ln w="28575" cmpd="sng">
+            <a:solidFill>
+              <a:srgbClr val="FF0000"/>
+            </a:solidFill>
+          </a:ln>
+        </p:spPr>
+        <p:style>
+          <a:lnRef idx="1">
+            <a:schemeClr val="accent1"/>
+          </a:lnRef>
+          <a:fillRef idx="3">
+            <a:schemeClr val="accent1"/>
+          </a:fillRef>
+          <a:effectRef idx="2">
+            <a:schemeClr val="accent1"/>
+          </a:effectRef>
+          <a:fontRef idx="minor">
+            <a:schemeClr val="lt1"/>
+          </a:fontRef>
+        </p:style>
+        <p:txBody>
+          <a:bodyPr rtlCol="0" anchor="ctr"/>
+          <a:lstStyle/>
+          <a:p>
+            <a:pPr algn="ctr"/>
+            <a:r>
+              <a:rPr kumimoji="1" lang="en-US" altLang="zh-TW" sz="1600" dirty="0" smtClean="0">
+                <a:solidFill>
+                  <a:srgbClr val="FF0000"/>
+                </a:solidFill>
+              </a:rPr>
+              <a:t>Closure </a:t>
+            </a:r>
+            <a:r>
+              <a:rPr kumimoji="1" lang="zh-TW" altLang="en-US" sz="1600" dirty="0" smtClean="0">
+                <a:solidFill>
+                  <a:srgbClr val="FF0000"/>
+                </a:solidFill>
+              </a:rPr>
+              <a:t>做為</a:t>
+            </a:r>
+            <a:r>
+              <a:rPr kumimoji="1" lang="en-US" altLang="zh-TW" sz="1600" dirty="0" smtClean="0">
+                <a:solidFill>
+                  <a:srgbClr val="FF0000"/>
+                </a:solidFill>
+              </a:rPr>
+              <a:t> data type</a:t>
+            </a:r>
+            <a:endParaRPr kumimoji="1" lang="zh-TW" altLang="en-US" sz="1600" dirty="0">
+              <a:solidFill>
+                <a:srgbClr val="FF0000"/>
+              </a:solidFill>
+            </a:endParaRPr>
+          </a:p>
+        </p:txBody>
+      </p:sp>
+      <p:sp>
+        <p:nvSpPr>
+          <p:cNvPr id="12" name="矩形圖說文字 11"/>
+          <p:cNvSpPr/>
+          <p:nvPr/>
+        </p:nvSpPr>
+        <p:spPr>
+          <a:xfrm>
+            <a:off x="7135670" y="1276976"/>
+            <a:ext cx="1516497" cy="464389"/>
+          </a:xfrm>
+          <a:prstGeom prst="wedgeRectCallout">
+            <a:avLst>
+              <a:gd name="adj1" fmla="val -70189"/>
+              <a:gd name="adj2" fmla="val -45830"/>
+            </a:avLst>
+          </a:prstGeom>
+          <a:solidFill>
+            <a:srgbClr val="FFFF00"/>
+          </a:solidFill>
+          <a:ln w="28575" cmpd="sng">
+            <a:solidFill>
+              <a:srgbClr val="FF0000"/>
+            </a:solidFill>
+          </a:ln>
+        </p:spPr>
+        <p:style>
+          <a:lnRef idx="1">
+            <a:schemeClr val="accent1"/>
+          </a:lnRef>
+          <a:fillRef idx="3">
+            <a:schemeClr val="accent1"/>
+          </a:fillRef>
+          <a:effectRef idx="2">
+            <a:schemeClr val="accent1"/>
+          </a:effectRef>
+          <a:fontRef idx="minor">
+            <a:schemeClr val="lt1"/>
+          </a:fontRef>
+        </p:style>
+        <p:txBody>
+          <a:bodyPr rtlCol="0" anchor="ctr"/>
+          <a:lstStyle/>
+          <a:p>
+            <a:pPr algn="ctr"/>
+            <a:r>
+              <a:rPr kumimoji="1" lang="zh-TW" altLang="en-US" sz="1600" dirty="0" smtClean="0">
+                <a:solidFill>
+                  <a:srgbClr val="FF0000"/>
+                </a:solidFill>
+              </a:rPr>
+              <a:t>導入關鍵字</a:t>
+            </a:r>
+            <a:r>
+              <a:rPr kumimoji="1" lang="en-US" altLang="zh-TW" sz="1600" dirty="0" smtClean="0">
+                <a:solidFill>
+                  <a:srgbClr val="FF0000"/>
+                </a:solidFill>
+              </a:rPr>
+              <a:t> in</a:t>
+            </a:r>
+            <a:endParaRPr kumimoji="1" lang="zh-TW" altLang="en-US" sz="1600" dirty="0">
+              <a:solidFill>
+                <a:srgbClr val="FF0000"/>
+              </a:solidFill>
+            </a:endParaRPr>
+          </a:p>
+        </p:txBody>
+      </p:sp>
+      <p:sp>
+        <p:nvSpPr>
+          <p:cNvPr id="14" name="矩形圖說文字 13"/>
+          <p:cNvSpPr/>
+          <p:nvPr/>
+        </p:nvSpPr>
+        <p:spPr>
+          <a:xfrm>
+            <a:off x="5847990" y="2190774"/>
+            <a:ext cx="2557746" cy="871910"/>
+          </a:xfrm>
+          <a:prstGeom prst="wedgeRectCallout">
+            <a:avLst>
+              <a:gd name="adj1" fmla="val -54000"/>
+              <a:gd name="adj2" fmla="val -139003"/>
+            </a:avLst>
+          </a:prstGeom>
+          <a:solidFill>
+            <a:srgbClr val="FFFF00"/>
+          </a:solidFill>
+          <a:ln w="28575" cmpd="sng">
+            <a:solidFill>
+              <a:srgbClr val="FF0000"/>
+            </a:solidFill>
+          </a:ln>
+        </p:spPr>
+        <p:style>
+          <a:lnRef idx="1">
+            <a:schemeClr val="accent1"/>
+          </a:lnRef>
+          <a:fillRef idx="3">
+            <a:schemeClr val="accent1"/>
+          </a:fillRef>
+          <a:effectRef idx="2">
+            <a:schemeClr val="accent1"/>
+          </a:effectRef>
+          <a:fontRef idx="minor">
+            <a:schemeClr val="lt1"/>
+          </a:fontRef>
+        </p:style>
+        <p:txBody>
+          <a:bodyPr rtlCol="0" anchor="ctr"/>
+          <a:lstStyle/>
+          <a:p>
+            <a:pPr algn="ctr"/>
+            <a:r>
+              <a:rPr kumimoji="1" lang="zh-TW" altLang="en-US" sz="1600" dirty="0">
+                <a:solidFill>
+                  <a:srgbClr val="FF0000"/>
+                </a:solidFill>
+              </a:rPr>
+              <a:t>呼叫函式拿</a:t>
+            </a:r>
+            <a:r>
+              <a:rPr kumimoji="1" lang="zh-TW" altLang="en-US" sz="1600" dirty="0" smtClean="0">
+                <a:solidFill>
+                  <a:srgbClr val="FF0000"/>
+                </a:solidFill>
+              </a:rPr>
+              <a:t>到的回傳值其實由被呼叫函數放進</a:t>
+            </a:r>
+            <a:r>
+              <a:rPr kumimoji="1" lang="zh-TW" altLang="en-US" sz="1600" dirty="0" smtClean="0">
+                <a:solidFill>
+                  <a:srgbClr val="FF0000"/>
+                </a:solidFill>
+              </a:rPr>
+              <a:t>參數裡</a:t>
+            </a:r>
+            <a:r>
+              <a:rPr kumimoji="1" lang="zh-TW" altLang="en-US" sz="1600" dirty="0" smtClean="0">
+                <a:solidFill>
+                  <a:srgbClr val="FF0000"/>
+                </a:solidFill>
+              </a:rPr>
+              <a:t>去的</a:t>
+            </a:r>
+            <a:r>
+              <a:rPr kumimoji="1" lang="en-US" altLang="zh-TW" sz="1600" dirty="0" smtClean="0">
+                <a:solidFill>
+                  <a:srgbClr val="FF0000"/>
+                </a:solidFill>
+              </a:rPr>
+              <a:t>. </a:t>
+            </a:r>
+            <a:r>
+              <a:rPr kumimoji="1" lang="zh-TW" altLang="en-US" sz="1600" dirty="0" smtClean="0">
+                <a:solidFill>
+                  <a:srgbClr val="FF0000"/>
+                </a:solidFill>
+              </a:rPr>
+              <a:t>這裡並且省略</a:t>
+            </a:r>
+            <a:r>
+              <a:rPr kumimoji="1" lang="en-US" altLang="zh-TW" sz="1600" dirty="0" smtClean="0">
+                <a:solidFill>
+                  <a:srgbClr val="FF0000"/>
+                </a:solidFill>
+              </a:rPr>
+              <a:t> </a:t>
+            </a:r>
+            <a:r>
+              <a:rPr kumimoji="1" lang="en-US" altLang="zh-TW" sz="1600" dirty="0" smtClean="0">
+                <a:solidFill>
+                  <a:srgbClr val="FF0000"/>
+                </a:solidFill>
+              </a:rPr>
+              <a:t>Void </a:t>
+            </a:r>
+            <a:endParaRPr kumimoji="1" lang="zh-TW" altLang="en-US" sz="1600" dirty="0">
+              <a:solidFill>
+                <a:srgbClr val="FF0000"/>
+              </a:solidFill>
+            </a:endParaRPr>
+          </a:p>
+        </p:txBody>
+      </p:sp>
+      <p:sp>
+        <p:nvSpPr>
+          <p:cNvPr id="15" name="矩形 14"/>
+          <p:cNvSpPr/>
+          <p:nvPr/>
+        </p:nvSpPr>
+        <p:spPr>
+          <a:xfrm>
+            <a:off x="642353" y="2426185"/>
+            <a:ext cx="3829971" cy="950777"/>
+          </a:xfrm>
+          <a:prstGeom prst="rect">
+            <a:avLst/>
+          </a:prstGeom>
+          <a:noFill/>
+          <a:ln w="19050" cmpd="sng">
+            <a:solidFill>
+              <a:srgbClr val="FF0000"/>
+            </a:solidFill>
+            <a:prstDash val="solid"/>
+          </a:ln>
+          <a:effectLst/>
+        </p:spPr>
+        <p:style>
+          <a:lnRef idx="1">
+            <a:schemeClr val="accent1"/>
+          </a:lnRef>
+          <a:fillRef idx="3">
+            <a:schemeClr val="accent1"/>
+          </a:fillRef>
+          <a:effectRef idx="2">
+            <a:schemeClr val="accent1"/>
+          </a:effectRef>
+          <a:fontRef idx="minor">
+            <a:schemeClr val="lt1"/>
+          </a:fontRef>
+        </p:style>
+        <p:txBody>
+          <a:bodyPr rtlCol="0" anchor="ctr"/>
+          <a:lstStyle/>
+          <a:p>
+            <a:pPr algn="ctr"/>
+            <a:endParaRPr kumimoji="1" lang="en-US" altLang="zh-TW" dirty="0" smtClean="0"/>
+          </a:p>
+          <a:p>
+            <a:pPr algn="ctr"/>
+            <a:endParaRPr kumimoji="1" lang="zh-TW" altLang="en-US" dirty="0"/>
+          </a:p>
+        </p:txBody>
+      </p:sp>
+      <p:sp>
+        <p:nvSpPr>
+          <p:cNvPr id="16" name="矩形圖說文字 15"/>
+          <p:cNvSpPr/>
+          <p:nvPr/>
+        </p:nvSpPr>
+        <p:spPr>
+          <a:xfrm>
+            <a:off x="1742790" y="4468562"/>
+            <a:ext cx="2008447" cy="464389"/>
+          </a:xfrm>
+          <a:prstGeom prst="wedgeRectCallout">
+            <a:avLst>
+              <a:gd name="adj1" fmla="val -63285"/>
+              <a:gd name="adj2" fmla="val -37666"/>
+            </a:avLst>
+          </a:prstGeom>
+          <a:solidFill>
+            <a:srgbClr val="FFFF00"/>
+          </a:solidFill>
+          <a:ln w="28575" cmpd="sng">
+            <a:solidFill>
+              <a:srgbClr val="FF0000"/>
+            </a:solidFill>
+          </a:ln>
+        </p:spPr>
+        <p:style>
+          <a:lnRef idx="1">
+            <a:schemeClr val="accent1"/>
+          </a:lnRef>
+          <a:fillRef idx="3">
+            <a:schemeClr val="accent1"/>
+          </a:fillRef>
+          <a:effectRef idx="2">
+            <a:schemeClr val="accent1"/>
+          </a:effectRef>
+          <a:fontRef idx="minor">
+            <a:schemeClr val="lt1"/>
+          </a:fontRef>
+        </p:style>
+        <p:txBody>
+          <a:bodyPr rtlCol="0" anchor="ctr"/>
+          <a:lstStyle/>
+          <a:p>
+            <a:pPr algn="ctr"/>
+            <a:r>
+              <a:rPr kumimoji="1" lang="zh-TW" altLang="en-US" sz="1600" dirty="0" smtClean="0">
+                <a:solidFill>
+                  <a:srgbClr val="FF0000"/>
+                </a:solidFill>
+              </a:rPr>
+              <a:t>做</a:t>
+            </a:r>
+            <a:r>
+              <a:rPr kumimoji="1" lang="zh-TW" altLang="en-US" sz="1600" dirty="0" smtClean="0">
+                <a:solidFill>
+                  <a:srgbClr val="FF0000"/>
+                </a:solidFill>
+              </a:rPr>
+              <a:t>一堆定位的工作</a:t>
+            </a:r>
+            <a:endParaRPr kumimoji="1" lang="zh-TW" altLang="en-US" sz="1600" dirty="0">
+              <a:solidFill>
+                <a:srgbClr val="FF0000"/>
+              </a:solidFill>
+            </a:endParaRPr>
+          </a:p>
+        </p:txBody>
+      </p:sp>
+      <p:sp>
+        <p:nvSpPr>
+          <p:cNvPr id="17" name="矩形 16"/>
+          <p:cNvSpPr/>
+          <p:nvPr/>
+        </p:nvSpPr>
+        <p:spPr>
+          <a:xfrm>
+            <a:off x="642353" y="4308213"/>
+            <a:ext cx="834139" cy="425715"/>
+          </a:xfrm>
+          <a:prstGeom prst="rect">
+            <a:avLst/>
+          </a:prstGeom>
+          <a:noFill/>
+          <a:ln w="19050" cmpd="sng">
+            <a:solidFill>
+              <a:srgbClr val="FF0000"/>
+            </a:solidFill>
+            <a:prstDash val="solid"/>
+          </a:ln>
+          <a:effectLst/>
+        </p:spPr>
+        <p:style>
+          <a:lnRef idx="1">
+            <a:schemeClr val="accent1"/>
+          </a:lnRef>
+          <a:fillRef idx="3">
+            <a:schemeClr val="accent1"/>
+          </a:fillRef>
+          <a:effectRef idx="2">
+            <a:schemeClr val="accent1"/>
+          </a:effectRef>
+          <a:fontRef idx="minor">
+            <a:schemeClr val="lt1"/>
+          </a:fontRef>
+        </p:style>
+        <p:txBody>
+          <a:bodyPr rtlCol="0" anchor="ctr"/>
+          <a:lstStyle/>
+          <a:p>
+            <a:pPr algn="ctr"/>
+            <a:endParaRPr kumimoji="1" lang="en-US" altLang="zh-TW" dirty="0" smtClean="0"/>
+          </a:p>
+          <a:p>
+            <a:pPr algn="ctr"/>
+            <a:endParaRPr kumimoji="1" lang="zh-TW" altLang="en-US" dirty="0"/>
+          </a:p>
+        </p:txBody>
+      </p:sp>
+      <p:sp>
+        <p:nvSpPr>
+          <p:cNvPr id="18" name="矩形圖說文字 17"/>
+          <p:cNvSpPr/>
+          <p:nvPr/>
+        </p:nvSpPr>
+        <p:spPr>
+          <a:xfrm>
+            <a:off x="1486721" y="1652856"/>
+            <a:ext cx="2008447" cy="575827"/>
+          </a:xfrm>
+          <a:prstGeom prst="wedgeRectCallout">
+            <a:avLst>
+              <a:gd name="adj1" fmla="val -49600"/>
+              <a:gd name="adj2" fmla="val -76441"/>
+            </a:avLst>
+          </a:prstGeom>
+          <a:solidFill>
+            <a:srgbClr val="FFFF00"/>
+          </a:solidFill>
+          <a:ln w="28575" cmpd="sng">
+            <a:solidFill>
+              <a:srgbClr val="FF0000"/>
+            </a:solidFill>
+          </a:ln>
+        </p:spPr>
+        <p:style>
+          <a:lnRef idx="1">
+            <a:schemeClr val="accent1"/>
+          </a:lnRef>
+          <a:fillRef idx="3">
+            <a:schemeClr val="accent1"/>
+          </a:fillRef>
+          <a:effectRef idx="2">
+            <a:schemeClr val="accent1"/>
+          </a:effectRef>
+          <a:fontRef idx="minor">
+            <a:schemeClr val="lt1"/>
+          </a:fontRef>
+        </p:style>
+        <p:txBody>
+          <a:bodyPr rtlCol="0" anchor="ctr"/>
+          <a:lstStyle/>
+          <a:p>
+            <a:pPr algn="ctr"/>
+            <a:r>
+              <a:rPr kumimoji="1" lang="zh-TW" altLang="en-US" sz="1600" dirty="0" smtClean="0">
+                <a:solidFill>
+                  <a:srgbClr val="FF0000"/>
+                </a:solidFill>
+              </a:rPr>
+              <a:t>參數被</a:t>
+            </a:r>
+            <a:r>
+              <a:rPr kumimoji="1" lang="en-US" altLang="zh-TW" sz="1600" dirty="0" smtClean="0">
+                <a:solidFill>
+                  <a:srgbClr val="FF0000"/>
+                </a:solidFill>
+              </a:rPr>
+              <a:t> call back </a:t>
+            </a:r>
+            <a:r>
+              <a:rPr kumimoji="1" lang="zh-TW" altLang="en-US" sz="1600" dirty="0" smtClean="0">
+                <a:solidFill>
+                  <a:srgbClr val="FF0000"/>
+                </a:solidFill>
+              </a:rPr>
+              <a:t>之後</a:t>
+            </a:r>
+            <a:r>
+              <a:rPr kumimoji="1" lang="en-US" altLang="zh-TW" sz="1600" dirty="0" smtClean="0">
+                <a:solidFill>
+                  <a:srgbClr val="FF0000"/>
+                </a:solidFill>
+              </a:rPr>
+              <a:t>, </a:t>
+            </a:r>
+            <a:r>
+              <a:rPr kumimoji="1" lang="zh-TW" altLang="en-US" sz="1600" dirty="0" smtClean="0">
+                <a:solidFill>
+                  <a:srgbClr val="FF0000"/>
+                </a:solidFill>
+              </a:rPr>
+              <a:t>責令要做的事</a:t>
+            </a:r>
+            <a:endParaRPr kumimoji="1" lang="zh-TW" altLang="en-US" sz="1600" dirty="0">
+              <a:solidFill>
+                <a:srgbClr val="FF0000"/>
+              </a:solidFill>
+            </a:endParaRPr>
+          </a:p>
+        </p:txBody>
+      </p:sp>
+      <p:sp>
+        <p:nvSpPr>
+          <p:cNvPr id="13" name="矩形圖說文字 12"/>
+          <p:cNvSpPr/>
+          <p:nvPr/>
+        </p:nvSpPr>
+        <p:spPr>
+          <a:xfrm>
+            <a:off x="2615955" y="2857994"/>
+            <a:ext cx="3023515" cy="608074"/>
+          </a:xfrm>
+          <a:prstGeom prst="wedgeRectCallout">
+            <a:avLst>
+              <a:gd name="adj1" fmla="val 5251"/>
+              <a:gd name="adj2" fmla="val -127539"/>
+            </a:avLst>
+          </a:prstGeom>
+          <a:solidFill>
+            <a:srgbClr val="FFFF00"/>
+          </a:solidFill>
+          <a:ln w="28575" cmpd="sng">
+            <a:solidFill>
+              <a:srgbClr val="FF0000"/>
+            </a:solidFill>
+          </a:ln>
+        </p:spPr>
+        <p:style>
+          <a:lnRef idx="1">
+            <a:schemeClr val="accent1"/>
+          </a:lnRef>
+          <a:fillRef idx="3">
+            <a:schemeClr val="accent1"/>
+          </a:fillRef>
+          <a:effectRef idx="2">
+            <a:schemeClr val="accent1"/>
+          </a:effectRef>
+          <a:fontRef idx="minor">
+            <a:schemeClr val="lt1"/>
+          </a:fontRef>
+        </p:style>
+        <p:txBody>
+          <a:bodyPr rtlCol="0" anchor="ctr"/>
+          <a:lstStyle/>
+          <a:p>
+            <a:pPr algn="ctr"/>
+            <a:r>
+              <a:rPr kumimoji="1" lang="en-US" altLang="zh-TW" sz="1600" dirty="0" smtClean="0">
+                <a:solidFill>
+                  <a:srgbClr val="FF0000"/>
+                </a:solidFill>
+              </a:rPr>
+              <a:t>Trailing Closure: </a:t>
+            </a:r>
+            <a:r>
+              <a:rPr kumimoji="1" lang="zh-TW" altLang="en-US" sz="1600" dirty="0" smtClean="0">
+                <a:solidFill>
+                  <a:srgbClr val="FF0000"/>
+                </a:solidFill>
+              </a:rPr>
+              <a:t>可以將參數名稱 </a:t>
+            </a:r>
+            <a:r>
+              <a:rPr kumimoji="1" lang="en-US" altLang="zh-TW" sz="1600" dirty="0">
+                <a:solidFill>
+                  <a:srgbClr val="FF0000"/>
+                </a:solidFill>
+              </a:rPr>
+              <a:t>Label </a:t>
+            </a:r>
+            <a:r>
+              <a:rPr kumimoji="1" lang="zh-TW" altLang="en-US" sz="1600" dirty="0">
+                <a:solidFill>
+                  <a:srgbClr val="FF0000"/>
+                </a:solidFill>
+              </a:rPr>
+              <a:t>及前後兩個小括弧省略</a:t>
+            </a:r>
+            <a:endParaRPr kumimoji="1" lang="zh-TW" altLang="en-US" sz="1600" dirty="0">
+              <a:solidFill>
+                <a:srgbClr val="FF0000"/>
+              </a:solidFill>
+            </a:endParaRPr>
+          </a:p>
+        </p:txBody>
+      </p:sp>
+    </p:spTree>
+    <p:extLst>
+      <p:ext uri="{BB962C8B-B14F-4D97-AF65-F5344CB8AC3E}">
+        <p14:creationId xmlns:p14="http://schemas.microsoft.com/office/powerpoint/2010/main" val="3712856604"/>
+      </p:ext>
+    </p:extLst>
+  </p:cSld>
+  <p:clrMapOvr>
+    <a:masterClrMapping/>
+  </p:clrMapOvr>
+  <p:timing>
+    <p:tnLst>
+      <p:par>
+        <p:cTn xmlns:p14="http://schemas.microsoft.com/office/powerpoint/2010/main" id="1" dur="indefinite" restart="never" nodeType="tmRoot"/>
+      </p:par>
+    </p:tnLst>
+  </p:timing>
+</p:sld>
+</file>
+
+<file path=ppt/slides/slide29.xml><?xml version="1.0" encoding="utf-8"?>
+<p:sld xmlns:a="http://schemas.openxmlformats.org/drawingml/2006/main" xmlns:r="http://schemas.openxmlformats.org/officeDocument/2006/relationships" xmlns:p="http://schemas.openxmlformats.org/presentationml/2006/main">
+  <p:cSld>
+    <p:spTree>
+      <p:nvGrpSpPr>
+        <p:cNvPr id="1" name=""/>
+        <p:cNvGrpSpPr/>
+        <p:nvPr/>
+      </p:nvGrpSpPr>
+      <p:grpSpPr>
+        <a:xfrm>
+          <a:off x="0" y="0"/>
+          <a:ext cx="0" cy="0"/>
+          <a:chOff x="0" y="0"/>
+          <a:chExt cx="0" cy="0"/>
+        </a:xfrm>
+      </p:grpSpPr>
+      <p:sp>
+        <p:nvSpPr>
+          <p:cNvPr id="2" name="標題 1"/>
+          <p:cNvSpPr>
+            <a:spLocks noGrp="1"/>
+          </p:cNvSpPr>
+          <p:nvPr>
+            <p:ph type="title"/>
+          </p:nvPr>
+        </p:nvSpPr>
+        <p:spPr/>
+        <p:txBody>
+          <a:bodyPr/>
+          <a:lstStyle/>
+          <a:p>
+            <a:r>
+              <a:rPr lang="en-US" altLang="zh-TW" dirty="0" smtClean="0"/>
+              <a:t> Trailing Closure</a:t>
+            </a:r>
+            <a:endParaRPr lang="zh-TW" altLang="en-US" dirty="0"/>
+          </a:p>
+        </p:txBody>
+      </p:sp>
+      <p:sp>
+        <p:nvSpPr>
+          <p:cNvPr id="3" name="內容版面配置區 2"/>
+          <p:cNvSpPr>
+            <a:spLocks noGrp="1"/>
+          </p:cNvSpPr>
+          <p:nvPr>
+            <p:ph idx="1"/>
+          </p:nvPr>
+        </p:nvSpPr>
+        <p:spPr>
+          <a:xfrm>
+            <a:off x="229251" y="901454"/>
+            <a:ext cx="8693313" cy="953528"/>
+          </a:xfrm>
+        </p:spPr>
+        <p:txBody>
+          <a:bodyPr>
+            <a:normAutofit/>
+          </a:bodyPr>
+          <a:lstStyle/>
+          <a:p>
+            <a:r>
+              <a:rPr lang="zh-TW" altLang="en-US" dirty="0" smtClean="0">
+                <a:sym typeface="Wingdings" panose="05000000000000000000" pitchFamily="2" charset="2"/>
+              </a:rPr>
+              <a:t>當函式的最後一個參數是</a:t>
+            </a:r>
+            <a:r>
+              <a:rPr lang="en-US" altLang="zh-TW" dirty="0" smtClean="0">
+                <a:sym typeface="Wingdings" panose="05000000000000000000" pitchFamily="2" charset="2"/>
+              </a:rPr>
+              <a:t> closure ( </a:t>
+            </a:r>
+            <a:r>
+              <a:rPr lang="zh-TW" altLang="en-US" dirty="0" smtClean="0">
+                <a:sym typeface="Wingdings" panose="05000000000000000000" pitchFamily="2" charset="2"/>
+              </a:rPr>
+              <a:t>以</a:t>
+            </a:r>
+            <a:r>
+              <a:rPr lang="en-US" altLang="zh-TW" dirty="0" smtClean="0">
+                <a:sym typeface="Wingdings" panose="05000000000000000000" pitchFamily="2" charset="2"/>
+              </a:rPr>
+              <a:t>{</a:t>
+            </a:r>
+            <a:r>
+              <a:rPr lang="mr-IN" altLang="zh-TW" dirty="0" smtClean="0">
+                <a:sym typeface="Wingdings" panose="05000000000000000000" pitchFamily="2" charset="2"/>
+              </a:rPr>
+              <a:t>…</a:t>
+            </a:r>
+            <a:r>
+              <a:rPr lang="en-US" altLang="zh-TW" dirty="0" smtClean="0">
+                <a:sym typeface="Wingdings" panose="05000000000000000000" pitchFamily="2" charset="2"/>
+              </a:rPr>
+              <a:t>.} </a:t>
+            </a:r>
+            <a:r>
+              <a:rPr lang="zh-TW" altLang="en-US" dirty="0" smtClean="0">
+                <a:sym typeface="Wingdings" panose="05000000000000000000" pitchFamily="2" charset="2"/>
+              </a:rPr>
+              <a:t>形式</a:t>
+            </a:r>
+            <a:r>
+              <a:rPr lang="zh-TW" altLang="en-US" dirty="0" smtClean="0">
+                <a:sym typeface="Wingdings" panose="05000000000000000000" pitchFamily="2" charset="2"/>
+              </a:rPr>
+              <a:t>的時候</a:t>
+            </a:r>
+            <a:r>
+              <a:rPr lang="en-US" altLang="zh-TW" dirty="0" smtClean="0">
+                <a:sym typeface="Wingdings" panose="05000000000000000000" pitchFamily="2" charset="2"/>
+              </a:rPr>
+              <a:t>, </a:t>
+            </a:r>
+            <a:r>
+              <a:rPr lang="zh-TW" altLang="en-US" dirty="0" smtClean="0">
+                <a:sym typeface="Wingdings" panose="05000000000000000000" pitchFamily="2" charset="2"/>
+              </a:rPr>
+              <a:t>可以將參數</a:t>
+            </a:r>
+            <a:r>
+              <a:rPr lang="en-US" altLang="zh-TW" dirty="0" smtClean="0">
+                <a:sym typeface="Wingdings" panose="05000000000000000000" pitchFamily="2" charset="2"/>
+              </a:rPr>
+              <a:t> Label </a:t>
+            </a:r>
+            <a:r>
+              <a:rPr lang="zh-TW" altLang="en-US" dirty="0" smtClean="0">
+                <a:sym typeface="Wingdings" panose="05000000000000000000" pitchFamily="2" charset="2"/>
+              </a:rPr>
+              <a:t>及前後兩個小括弧省略</a:t>
+            </a:r>
+            <a:r>
+              <a:rPr lang="en-US" altLang="zh-TW" dirty="0" smtClean="0">
+                <a:sym typeface="Wingdings" panose="05000000000000000000" pitchFamily="2" charset="2"/>
+              </a:rPr>
+              <a:t>. </a:t>
+            </a:r>
+            <a:r>
+              <a:rPr lang="zh-TW" altLang="en-US" dirty="0" smtClean="0">
+                <a:sym typeface="Wingdings" panose="05000000000000000000" pitchFamily="2" charset="2"/>
+              </a:rPr>
+              <a:t>使城市看起來更優雅</a:t>
+            </a:r>
+            <a:r>
+              <a:rPr lang="en-US" altLang="zh-TW" dirty="0" smtClean="0">
+                <a:sym typeface="Wingdings" panose="05000000000000000000" pitchFamily="2" charset="2"/>
+              </a:rPr>
+              <a:t>.</a:t>
+            </a:r>
+            <a:endParaRPr lang="en-US" altLang="zh-TW" dirty="0" smtClean="0">
+              <a:sym typeface="Wingdings" panose="05000000000000000000" pitchFamily="2" charset="2"/>
+            </a:endParaRPr>
+          </a:p>
+        </p:txBody>
+      </p:sp>
+      <p:pic>
+        <p:nvPicPr>
+          <p:cNvPr id="4" name="圖片 3" descr="螢幕快照 2017-03-20 上午9.35.57.png"/>
+          <p:cNvPicPr>
+            <a:picLocks noChangeAspect="1"/>
+          </p:cNvPicPr>
+          <p:nvPr/>
+        </p:nvPicPr>
+        <p:blipFill>
+          <a:blip r:embed="rId2">
+            <a:extLst>
+              <a:ext uri="{28A0092B-C50C-407E-A947-70E740481C1C}">
+                <a14:useLocalDpi xmlns:a14="http://schemas.microsoft.com/office/drawing/2010/main" val="0"/>
+              </a:ext>
+            </a:extLst>
+          </a:blip>
+          <a:stretch>
+            <a:fillRect/>
+          </a:stretch>
+        </p:blipFill>
+        <p:spPr>
+          <a:xfrm>
+            <a:off x="62141" y="2774116"/>
+            <a:ext cx="8938767" cy="3539598"/>
+          </a:xfrm>
+          <a:prstGeom prst="rect">
+            <a:avLst/>
+          </a:prstGeom>
+        </p:spPr>
+      </p:pic>
+      <p:sp>
+        <p:nvSpPr>
+          <p:cNvPr id="5" name="矩形 4"/>
+          <p:cNvSpPr/>
+          <p:nvPr/>
+        </p:nvSpPr>
+        <p:spPr>
+          <a:xfrm>
+            <a:off x="779057" y="5170576"/>
+            <a:ext cx="6281302" cy="619974"/>
+          </a:xfrm>
+          <a:prstGeom prst="rect">
+            <a:avLst/>
+          </a:prstGeom>
+          <a:noFill/>
+          <a:ln w="19050" cmpd="sng">
+            <a:solidFill>
+              <a:srgbClr val="FF0000"/>
+            </a:solidFill>
+            <a:prstDash val="solid"/>
+          </a:ln>
+          <a:effectLst/>
+        </p:spPr>
+        <p:style>
+          <a:lnRef idx="1">
+            <a:schemeClr val="accent1"/>
+          </a:lnRef>
+          <a:fillRef idx="3">
+            <a:schemeClr val="accent1"/>
+          </a:fillRef>
+          <a:effectRef idx="2">
+            <a:schemeClr val="accent1"/>
+          </a:effectRef>
+          <a:fontRef idx="minor">
+            <a:schemeClr val="lt1"/>
+          </a:fontRef>
+        </p:style>
+        <p:txBody>
+          <a:bodyPr rtlCol="0" anchor="ctr"/>
+          <a:lstStyle/>
+          <a:p>
+            <a:pPr algn="ctr"/>
+            <a:endParaRPr kumimoji="1" lang="en-US" altLang="zh-TW" dirty="0" smtClean="0"/>
+          </a:p>
+          <a:p>
+            <a:pPr algn="ctr"/>
+            <a:endParaRPr kumimoji="1" lang="zh-TW" altLang="en-US" dirty="0"/>
+          </a:p>
+        </p:txBody>
+      </p:sp>
+      <p:sp>
+        <p:nvSpPr>
+          <p:cNvPr id="8" name="矩形圖說文字 7"/>
+          <p:cNvSpPr/>
+          <p:nvPr/>
+        </p:nvSpPr>
+        <p:spPr>
+          <a:xfrm>
+            <a:off x="6333435" y="3308886"/>
+            <a:ext cx="2248794" cy="668462"/>
+          </a:xfrm>
+          <a:prstGeom prst="wedgeRectCallout">
+            <a:avLst>
+              <a:gd name="adj1" fmla="val -43836"/>
+              <a:gd name="adj2" fmla="val 95158"/>
+            </a:avLst>
+          </a:prstGeom>
+          <a:solidFill>
+            <a:srgbClr val="FFFF00"/>
+          </a:solidFill>
+          <a:ln w="28575" cmpd="sng">
+            <a:solidFill>
+              <a:srgbClr val="FF0000"/>
+            </a:solidFill>
+          </a:ln>
+        </p:spPr>
+        <p:style>
+          <a:lnRef idx="1">
+            <a:schemeClr val="accent1"/>
+          </a:lnRef>
+          <a:fillRef idx="3">
+            <a:schemeClr val="accent1"/>
+          </a:fillRef>
+          <a:effectRef idx="2">
+            <a:schemeClr val="accent1"/>
+          </a:effectRef>
+          <a:fontRef idx="minor">
+            <a:schemeClr val="lt1"/>
+          </a:fontRef>
+        </p:style>
+        <p:txBody>
+          <a:bodyPr rtlCol="0" anchor="ctr"/>
+          <a:lstStyle/>
+          <a:p>
+            <a:pPr algn="ctr"/>
+            <a:r>
+              <a:rPr kumimoji="1" lang="en-US" altLang="zh-TW" sz="1600" dirty="0" smtClean="0">
+                <a:solidFill>
+                  <a:srgbClr val="FF0000"/>
+                </a:solidFill>
+              </a:rPr>
+              <a:t>(</a:t>
+            </a:r>
+            <a:r>
+              <a:rPr kumimoji="1" lang="en-US" altLang="zh-TW" sz="1600" dirty="0" err="1" smtClean="0">
+                <a:solidFill>
+                  <a:srgbClr val="FF0000"/>
+                </a:solidFill>
+              </a:rPr>
+              <a:t>completionHandler</a:t>
+            </a:r>
+            <a:r>
+              <a:rPr kumimoji="1" lang="mr-IN" altLang="zh-TW" sz="1600" dirty="0" smtClean="0">
+                <a:solidFill>
+                  <a:srgbClr val="FF0000"/>
+                </a:solidFill>
+              </a:rPr>
+              <a:t>…</a:t>
+            </a:r>
+            <a:r>
+              <a:rPr kumimoji="1" lang="en-US" altLang="zh-TW" sz="1600" dirty="0" smtClean="0">
+                <a:solidFill>
+                  <a:srgbClr val="FF0000"/>
+                </a:solidFill>
+              </a:rPr>
+              <a:t>  ) </a:t>
+            </a:r>
+            <a:r>
+              <a:rPr kumimoji="1" lang="zh-TW" altLang="en-US" sz="1600" dirty="0" smtClean="0">
+                <a:solidFill>
+                  <a:srgbClr val="FF0000"/>
+                </a:solidFill>
+              </a:rPr>
+              <a:t>被省略了</a:t>
+            </a:r>
+            <a:endParaRPr kumimoji="1" lang="en-US" altLang="zh-TW" sz="1600" dirty="0" smtClean="0">
+              <a:solidFill>
+                <a:srgbClr val="FF0000"/>
+              </a:solidFill>
+            </a:endParaRPr>
+          </a:p>
+        </p:txBody>
+      </p:sp>
+      <p:sp>
+        <p:nvSpPr>
+          <p:cNvPr id="11" name="矩形 10"/>
+          <p:cNvSpPr/>
+          <p:nvPr/>
+        </p:nvSpPr>
+        <p:spPr>
+          <a:xfrm>
+            <a:off x="4403325" y="4353358"/>
+            <a:ext cx="2072970" cy="325875"/>
+          </a:xfrm>
+          <a:prstGeom prst="rect">
+            <a:avLst/>
+          </a:prstGeom>
+          <a:solidFill>
+            <a:schemeClr val="accent6">
+              <a:lumMod val="60000"/>
+              <a:lumOff val="40000"/>
+              <a:alpha val="20000"/>
+            </a:schemeClr>
+          </a:solidFill>
+          <a:ln w="19050" cmpd="sng">
+            <a:solidFill>
+              <a:srgbClr val="FF0000"/>
+            </a:solidFill>
+            <a:prstDash val="solid"/>
+          </a:ln>
+          <a:effectLst/>
+        </p:spPr>
+        <p:style>
+          <a:lnRef idx="1">
+            <a:schemeClr val="accent1"/>
+          </a:lnRef>
+          <a:fillRef idx="3">
+            <a:schemeClr val="accent1"/>
+          </a:fillRef>
+          <a:effectRef idx="2">
+            <a:schemeClr val="accent1"/>
+          </a:effectRef>
+          <a:fontRef idx="minor">
+            <a:schemeClr val="lt1"/>
+          </a:fontRef>
+        </p:style>
+        <p:txBody>
+          <a:bodyPr rtlCol="0" anchor="ctr"/>
+          <a:lstStyle/>
+          <a:p>
+            <a:pPr algn="ctr"/>
+            <a:endParaRPr kumimoji="1" lang="en-US" altLang="zh-TW" dirty="0" smtClean="0"/>
+          </a:p>
+          <a:p>
+            <a:pPr algn="ctr"/>
+            <a:endParaRPr kumimoji="1" lang="zh-TW" altLang="en-US" dirty="0"/>
+          </a:p>
+        </p:txBody>
+      </p:sp>
+      <p:sp>
+        <p:nvSpPr>
+          <p:cNvPr id="29" name="矩形圖說文字 28"/>
+          <p:cNvSpPr/>
+          <p:nvPr/>
+        </p:nvSpPr>
+        <p:spPr>
+          <a:xfrm>
+            <a:off x="5369481" y="6086198"/>
+            <a:ext cx="2090865" cy="455031"/>
+          </a:xfrm>
+          <a:prstGeom prst="wedgeRectCallout">
+            <a:avLst>
+              <a:gd name="adj1" fmla="val 7256"/>
+              <a:gd name="adj2" fmla="val -109213"/>
+            </a:avLst>
+          </a:prstGeom>
+          <a:solidFill>
+            <a:srgbClr val="FFFF00"/>
+          </a:solidFill>
+          <a:ln w="28575" cmpd="sng">
+            <a:solidFill>
+              <a:srgbClr val="FF0000"/>
+            </a:solidFill>
+          </a:ln>
+        </p:spPr>
+        <p:style>
+          <a:lnRef idx="1">
+            <a:schemeClr val="accent1"/>
+          </a:lnRef>
+          <a:fillRef idx="3">
+            <a:schemeClr val="accent1"/>
+          </a:fillRef>
+          <a:effectRef idx="2">
+            <a:schemeClr val="accent1"/>
+          </a:effectRef>
+          <a:fontRef idx="minor">
+            <a:schemeClr val="lt1"/>
+          </a:fontRef>
+        </p:style>
+        <p:txBody>
+          <a:bodyPr rtlCol="0" anchor="ctr"/>
+          <a:lstStyle/>
+          <a:p>
+            <a:pPr algn="ctr"/>
+            <a:r>
+              <a:rPr kumimoji="1" lang="en-US" altLang="zh-TW" dirty="0" smtClean="0">
+                <a:solidFill>
+                  <a:srgbClr val="FF0000"/>
+                </a:solidFill>
+              </a:rPr>
+              <a:t>Trailing Closure</a:t>
+            </a:r>
+            <a:endParaRPr kumimoji="1" lang="en-US" altLang="zh-TW" dirty="0">
+              <a:solidFill>
+                <a:srgbClr val="FF0000"/>
+              </a:solidFill>
+            </a:endParaRPr>
+          </a:p>
+        </p:txBody>
+      </p:sp>
+      <p:sp>
+        <p:nvSpPr>
+          <p:cNvPr id="20" name="矩形 19"/>
+          <p:cNvSpPr/>
+          <p:nvPr/>
+        </p:nvSpPr>
+        <p:spPr>
+          <a:xfrm>
+            <a:off x="1127986" y="4706296"/>
+            <a:ext cx="292441" cy="325875"/>
+          </a:xfrm>
+          <a:prstGeom prst="rect">
+            <a:avLst/>
+          </a:prstGeom>
+          <a:solidFill>
+            <a:schemeClr val="accent6">
+              <a:lumMod val="60000"/>
+              <a:lumOff val="40000"/>
+              <a:alpha val="20000"/>
+            </a:schemeClr>
+          </a:solidFill>
+          <a:ln w="19050" cmpd="sng">
+            <a:solidFill>
+              <a:srgbClr val="FF0000"/>
+            </a:solidFill>
+            <a:prstDash val="solid"/>
+          </a:ln>
+          <a:effectLst/>
+        </p:spPr>
+        <p:style>
+          <a:lnRef idx="1">
+            <a:schemeClr val="accent1"/>
+          </a:lnRef>
+          <a:fillRef idx="3">
+            <a:schemeClr val="accent1"/>
+          </a:fillRef>
+          <a:effectRef idx="2">
+            <a:schemeClr val="accent1"/>
+          </a:effectRef>
+          <a:fontRef idx="minor">
+            <a:schemeClr val="lt1"/>
+          </a:fontRef>
+        </p:style>
+        <p:txBody>
+          <a:bodyPr rtlCol="0" anchor="ctr"/>
+          <a:lstStyle/>
+          <a:p>
+            <a:pPr algn="ctr"/>
+            <a:endParaRPr kumimoji="1" lang="en-US" altLang="zh-TW" dirty="0" smtClean="0"/>
+          </a:p>
+          <a:p>
+            <a:pPr algn="ctr"/>
+            <a:endParaRPr kumimoji="1" lang="zh-TW" altLang="en-US" dirty="0"/>
+          </a:p>
+        </p:txBody>
+      </p:sp>
+    </p:spTree>
+    <p:extLst>
+      <p:ext uri="{BB962C8B-B14F-4D97-AF65-F5344CB8AC3E}">
+        <p14:creationId xmlns:p14="http://schemas.microsoft.com/office/powerpoint/2010/main" val="2947876743"/>
+      </p:ext>
+    </p:extLst>
+  </p:cSld>
+  <p:clrMapOvr>
+    <a:masterClrMapping/>
+  </p:clrMapOvr>
+  <p:timing>
+    <p:tnLst>
+      <p:par>
+        <p:cTn xmlns:p14="http://schemas.microsoft.com/office/powerpoint/2010/main" id="1" dur="indefinite" restart="never" nodeType="tmRoot"/>
+      </p:par>
+    </p:tnLst>
+  </p:timing>
+</p:sld>
+</file>
+
+<file path=ppt/slides/slide3.xml><?xml version="1.0" encoding="utf-8"?>
+<p:sld xmlns:a="http://schemas.openxmlformats.org/drawingml/2006/main" xmlns:r="http://schemas.openxmlformats.org/officeDocument/2006/relationships" xmlns:p="http://schemas.openxmlformats.org/presentationml/2006/main">
+  <p:cSld>
+    <p:spTree>
+      <p:nvGrpSpPr>
+        <p:cNvPr id="1" name=""/>
+        <p:cNvGrpSpPr/>
+        <p:nvPr/>
+      </p:nvGrpSpPr>
+      <p:grpSpPr>
+        <a:xfrm>
+          <a:off x="0" y="0"/>
+          <a:ext cx="0" cy="0"/>
+          <a:chOff x="0" y="0"/>
+          <a:chExt cx="0" cy="0"/>
+        </a:xfrm>
+      </p:grpSpPr>
+      <p:sp>
+        <p:nvSpPr>
+          <p:cNvPr id="2" name="標題 1"/>
+          <p:cNvSpPr>
+            <a:spLocks noGrp="1"/>
+          </p:cNvSpPr>
+          <p:nvPr>
+            <p:ph type="title"/>
+          </p:nvPr>
+        </p:nvSpPr>
+        <p:spPr/>
+        <p:txBody>
+          <a:bodyPr/>
+          <a:lstStyle/>
+          <a:p>
+            <a:r>
+              <a:rPr kumimoji="1" lang="en-US" altLang="zh-TW" dirty="0" smtClean="0"/>
+              <a:t>Delegation</a:t>
+            </a:r>
+            <a:endParaRPr kumimoji="1" lang="zh-TW" altLang="en-US" dirty="0"/>
+          </a:p>
+        </p:txBody>
+      </p:sp>
+      <p:sp>
+        <p:nvSpPr>
+          <p:cNvPr id="3" name="內容版面配置區 2"/>
+          <p:cNvSpPr>
+            <a:spLocks noGrp="1"/>
+          </p:cNvSpPr>
+          <p:nvPr>
+            <p:ph idx="1"/>
+          </p:nvPr>
+        </p:nvSpPr>
+        <p:spPr>
+          <a:xfrm>
+            <a:off x="229251" y="829286"/>
+            <a:ext cx="8693313" cy="5612702"/>
+          </a:xfrm>
+        </p:spPr>
+        <p:txBody>
+          <a:bodyPr>
+            <a:normAutofit fontScale="92500"/>
+          </a:bodyPr>
+          <a:lstStyle/>
+          <a:p>
+            <a:r>
+              <a:rPr kumimoji="1" lang="en-US" altLang="zh-TW" dirty="0" smtClean="0"/>
+              <a:t>Delegation </a:t>
+            </a:r>
+            <a:r>
+              <a:rPr kumimoji="1" lang="en-US" altLang="zh-TW" dirty="0"/>
+              <a:t>is a simple and powerful pattern in which one object in a program acts on behalf of, or in coordination with, another </a:t>
+            </a:r>
+            <a:r>
+              <a:rPr kumimoji="1" lang="en-US" altLang="zh-TW" dirty="0" smtClean="0"/>
+              <a:t>object.</a:t>
+            </a:r>
+          </a:p>
+          <a:p>
+            <a:r>
+              <a:rPr kumimoji="1" lang="en-US" altLang="zh-TW" dirty="0" smtClean="0"/>
+              <a:t>The “</a:t>
+            </a:r>
+            <a:r>
+              <a:rPr kumimoji="1" lang="en-US" altLang="zh-TW" dirty="0" smtClean="0">
+                <a:solidFill>
+                  <a:srgbClr val="3366FF"/>
+                </a:solidFill>
+              </a:rPr>
+              <a:t>delegating object</a:t>
+            </a:r>
+            <a:r>
+              <a:rPr kumimoji="1" lang="en-US" altLang="zh-TW" dirty="0" smtClean="0"/>
+              <a:t>” </a:t>
+            </a:r>
+            <a:r>
+              <a:rPr kumimoji="1" lang="en-US" altLang="zh-TW" dirty="0"/>
+              <a:t>keeps a reference to the other object—the </a:t>
+            </a:r>
+            <a:r>
+              <a:rPr kumimoji="1" lang="en-US" altLang="zh-TW" dirty="0">
+                <a:solidFill>
+                  <a:srgbClr val="FF0000"/>
+                </a:solidFill>
+              </a:rPr>
+              <a:t>delegate</a:t>
+            </a:r>
+            <a:r>
+              <a:rPr kumimoji="1" lang="en-US" altLang="zh-TW" dirty="0"/>
+              <a:t>—and at the appropriate time sends a message to it. </a:t>
+            </a:r>
+            <a:endParaRPr kumimoji="1" lang="en-US" altLang="zh-TW" dirty="0" smtClean="0"/>
+          </a:p>
+          <a:p>
+            <a:r>
+              <a:rPr kumimoji="1" lang="en-US" altLang="zh-TW" dirty="0"/>
+              <a:t>The </a:t>
+            </a:r>
+            <a:r>
+              <a:rPr kumimoji="1" lang="en-US" altLang="zh-TW" dirty="0">
+                <a:solidFill>
+                  <a:srgbClr val="3366FF"/>
+                </a:solidFill>
+              </a:rPr>
+              <a:t>delegating object </a:t>
+            </a:r>
+            <a:r>
+              <a:rPr kumimoji="1" lang="en-US" altLang="zh-TW" dirty="0"/>
+              <a:t>is typically a framework object, and the </a:t>
+            </a:r>
+            <a:r>
+              <a:rPr kumimoji="1" lang="en-US" altLang="zh-TW" dirty="0">
+                <a:solidFill>
+                  <a:srgbClr val="FF0000"/>
+                </a:solidFill>
+              </a:rPr>
+              <a:t>delegate</a:t>
+            </a:r>
+            <a:r>
+              <a:rPr kumimoji="1" lang="en-US" altLang="zh-TW" dirty="0"/>
+              <a:t> is typically a custom controller object. </a:t>
+            </a:r>
+          </a:p>
+          <a:p>
+            <a:r>
+              <a:rPr kumimoji="1" lang="en-US" altLang="zh-TW" dirty="0" smtClean="0"/>
+              <a:t>The </a:t>
+            </a:r>
+            <a:r>
+              <a:rPr kumimoji="1" lang="en-US" altLang="zh-TW" dirty="0"/>
+              <a:t>message informs the </a:t>
+            </a:r>
+            <a:r>
+              <a:rPr kumimoji="1" lang="en-US" altLang="zh-TW" dirty="0">
+                <a:solidFill>
+                  <a:srgbClr val="FF0000"/>
+                </a:solidFill>
+              </a:rPr>
+              <a:t>delegate</a:t>
+            </a:r>
+            <a:r>
+              <a:rPr kumimoji="1" lang="en-US" altLang="zh-TW" dirty="0"/>
+              <a:t> of an event that the </a:t>
+            </a:r>
+            <a:r>
+              <a:rPr kumimoji="1" lang="en-US" altLang="zh-TW" dirty="0" smtClean="0"/>
+              <a:t>“</a:t>
+            </a:r>
+            <a:r>
+              <a:rPr kumimoji="1" lang="en-US" altLang="zh-TW" dirty="0" smtClean="0">
+                <a:solidFill>
+                  <a:srgbClr val="3366FF"/>
+                </a:solidFill>
+              </a:rPr>
+              <a:t>delegating object</a:t>
+            </a:r>
+            <a:r>
+              <a:rPr kumimoji="1" lang="en-US" altLang="zh-TW" dirty="0" smtClean="0"/>
+              <a:t>” </a:t>
+            </a:r>
+            <a:r>
+              <a:rPr kumimoji="1" lang="en-US" altLang="zh-TW" dirty="0"/>
+              <a:t>is about to handle or has just handled. </a:t>
+            </a:r>
+            <a:endParaRPr kumimoji="1" lang="en-US" altLang="zh-TW" dirty="0" smtClean="0"/>
+          </a:p>
+          <a:p>
+            <a:r>
+              <a:rPr kumimoji="1" lang="en-US" altLang="zh-TW" dirty="0" smtClean="0"/>
+              <a:t>The </a:t>
+            </a:r>
+            <a:r>
+              <a:rPr kumimoji="1" lang="en-US" altLang="zh-TW" dirty="0">
+                <a:solidFill>
+                  <a:srgbClr val="FF0000"/>
+                </a:solidFill>
+              </a:rPr>
+              <a:t>delegate</a:t>
+            </a:r>
+            <a:r>
+              <a:rPr kumimoji="1" lang="en-US" altLang="zh-TW" dirty="0"/>
+              <a:t> may respond to the message by updating the </a:t>
+            </a:r>
+            <a:r>
+              <a:rPr kumimoji="1" lang="en-US" altLang="zh-TW" dirty="0" smtClean="0"/>
+              <a:t>appearance, </a:t>
+            </a:r>
+            <a:r>
+              <a:rPr kumimoji="1" lang="en-US" altLang="zh-TW" dirty="0"/>
+              <a:t>or state of </a:t>
+            </a:r>
+            <a:r>
+              <a:rPr kumimoji="1" lang="en-US" altLang="zh-TW" dirty="0" smtClean="0"/>
+              <a:t>itself, </a:t>
+            </a:r>
+            <a:r>
+              <a:rPr kumimoji="1" lang="en-US" altLang="zh-TW" dirty="0"/>
+              <a:t>or other objects in the application, and in some cases it can return a value that affects how an impending event is handled. </a:t>
+            </a:r>
+            <a:endParaRPr kumimoji="1" lang="en-US" altLang="zh-TW" dirty="0" smtClean="0"/>
+          </a:p>
+          <a:p>
+            <a:r>
+              <a:rPr kumimoji="1" lang="en-US" altLang="zh-TW" dirty="0" smtClean="0"/>
+              <a:t>The </a:t>
+            </a:r>
+            <a:r>
+              <a:rPr kumimoji="1" lang="en-US" altLang="zh-TW" dirty="0"/>
+              <a:t>main value of delegation is that it allows you to easily customize the behavior of several objects in one central object</a:t>
+            </a:r>
+            <a:r>
+              <a:rPr kumimoji="1" lang="en-US" altLang="zh-TW" dirty="0" smtClean="0"/>
+              <a:t>.</a:t>
+            </a:r>
+          </a:p>
+        </p:txBody>
+      </p:sp>
+    </p:spTree>
+    <p:extLst>
+      <p:ext uri="{BB962C8B-B14F-4D97-AF65-F5344CB8AC3E}">
+        <p14:creationId xmlns:p14="http://schemas.microsoft.com/office/powerpoint/2010/main" val="2607682321"/>
+      </p:ext>
+    </p:extLst>
+  </p:cSld>
+  <p:clrMapOvr>
+    <a:masterClrMapping/>
+  </p:clrMapOvr>
+  <p:timing>
+    <p:tnLst>
+      <p:par>
+        <p:cTn xmlns:p14="http://schemas.microsoft.com/office/powerpoint/2010/main" id="1" dur="indefinite" restart="never" nodeType="tmRoot"/>
+      </p:par>
+    </p:tnLst>
+  </p:timing>
+</p:sld>
+</file>
+
+<file path=ppt/slides/slide30.xml><?xml version="1.0" encoding="utf-8"?>
 <p:sld xmlns:a="http://schemas.openxmlformats.org/drawingml/2006/main" xmlns:r="http://schemas.openxmlformats.org/officeDocument/2006/relationships" xmlns:p="http://schemas.openxmlformats.org/presentationml/2006/main">
   <p:cSld>
     <p:spTree>
@@ -15271,7 +18804,7 @@
 </p:sld>
 </file>
 
-<file path=ppt/slides/slide27.xml><?xml version="1.0" encoding="utf-8"?>
+<file path=ppt/slides/slide31.xml><?xml version="1.0" encoding="utf-8"?>
 <p:sld xmlns:a="http://schemas.openxmlformats.org/drawingml/2006/main" xmlns:r="http://schemas.openxmlformats.org/officeDocument/2006/relationships" xmlns:p="http://schemas.openxmlformats.org/presentationml/2006/main">
   <p:cSld>
     <p:spTree>
@@ -15669,7 +19202,7 @@
 </p:sld>
 </file>
 
-<file path=ppt/slides/slide28.xml><?xml version="1.0" encoding="utf-8"?>
+<file path=ppt/slides/slide32.xml><?xml version="1.0" encoding="utf-8"?>
 <p:sld xmlns:a="http://schemas.openxmlformats.org/drawingml/2006/main" xmlns:r="http://schemas.openxmlformats.org/officeDocument/2006/relationships" xmlns:p="http://schemas.openxmlformats.org/presentationml/2006/main">
   <p:cSld>
     <p:spTree>
@@ -16361,7 +19894,7 @@
 </p:sld>
 </file>
 
-<file path=ppt/slides/slide29.xml><?xml version="1.0" encoding="utf-8"?>
+<file path=ppt/slides/slide33.xml><?xml version="1.0" encoding="utf-8"?>
 <p:sld xmlns:a="http://schemas.openxmlformats.org/drawingml/2006/main" xmlns:r="http://schemas.openxmlformats.org/officeDocument/2006/relationships" xmlns:p="http://schemas.openxmlformats.org/presentationml/2006/main">
   <p:cSld>
     <p:spTree>
@@ -16698,261 +20231,7 @@
 </p:sld>
 </file>
 
-<file path=ppt/slides/slide3.xml><?xml version="1.0" encoding="utf-8"?>
-<p:sld xmlns:a="http://schemas.openxmlformats.org/drawingml/2006/main" xmlns:r="http://schemas.openxmlformats.org/officeDocument/2006/relationships" xmlns:p="http://schemas.openxmlformats.org/presentationml/2006/main">
-  <p:cSld>
-    <p:spTree>
-      <p:nvGrpSpPr>
-        <p:cNvPr id="1" name=""/>
-        <p:cNvGrpSpPr/>
-        <p:nvPr/>
-      </p:nvGrpSpPr>
-      <p:grpSpPr>
-        <a:xfrm>
-          <a:off x="0" y="0"/>
-          <a:ext cx="0" cy="0"/>
-          <a:chOff x="0" y="0"/>
-          <a:chExt cx="0" cy="0"/>
-        </a:xfrm>
-      </p:grpSpPr>
-      <p:sp>
-        <p:nvSpPr>
-          <p:cNvPr id="2" name="標題 1"/>
-          <p:cNvSpPr>
-            <a:spLocks noGrp="1"/>
-          </p:cNvSpPr>
-          <p:nvPr>
-            <p:ph type="title"/>
-          </p:nvPr>
-        </p:nvSpPr>
-        <p:spPr/>
-        <p:txBody>
-          <a:bodyPr/>
-          <a:lstStyle/>
-          <a:p>
-            <a:r>
-              <a:rPr kumimoji="1" lang="en-US" altLang="zh-TW" dirty="0" smtClean="0"/>
-              <a:t>Delegation</a:t>
-            </a:r>
-            <a:endParaRPr kumimoji="1" lang="zh-TW" altLang="en-US" dirty="0"/>
-          </a:p>
-        </p:txBody>
-      </p:sp>
-      <p:sp>
-        <p:nvSpPr>
-          <p:cNvPr id="3" name="內容版面配置區 2"/>
-          <p:cNvSpPr>
-            <a:spLocks noGrp="1"/>
-          </p:cNvSpPr>
-          <p:nvPr>
-            <p:ph idx="1"/>
-          </p:nvPr>
-        </p:nvSpPr>
-        <p:spPr>
-          <a:xfrm>
-            <a:off x="229251" y="829286"/>
-            <a:ext cx="8693313" cy="5612702"/>
-          </a:xfrm>
-        </p:spPr>
-        <p:txBody>
-          <a:bodyPr>
-            <a:normAutofit fontScale="92500"/>
-          </a:bodyPr>
-          <a:lstStyle/>
-          <a:p>
-            <a:r>
-              <a:rPr kumimoji="1" lang="en-US" altLang="zh-TW" dirty="0" smtClean="0"/>
-              <a:t>Delegation </a:t>
-            </a:r>
-            <a:r>
-              <a:rPr kumimoji="1" lang="en-US" altLang="zh-TW" dirty="0"/>
-              <a:t>is a simple and powerful pattern in which one object in a program acts on behalf of, or in coordination with, another </a:t>
-            </a:r>
-            <a:r>
-              <a:rPr kumimoji="1" lang="en-US" altLang="zh-TW" dirty="0" smtClean="0"/>
-              <a:t>object.</a:t>
-            </a:r>
-          </a:p>
-          <a:p>
-            <a:r>
-              <a:rPr kumimoji="1" lang="en-US" altLang="zh-TW" dirty="0" smtClean="0"/>
-              <a:t>The “</a:t>
-            </a:r>
-            <a:r>
-              <a:rPr kumimoji="1" lang="en-US" altLang="zh-TW" dirty="0" smtClean="0">
-                <a:solidFill>
-                  <a:srgbClr val="3366FF"/>
-                </a:solidFill>
-              </a:rPr>
-              <a:t>delegating object</a:t>
-            </a:r>
-            <a:r>
-              <a:rPr kumimoji="1" lang="en-US" altLang="zh-TW" dirty="0" smtClean="0"/>
-              <a:t>” </a:t>
-            </a:r>
-            <a:r>
-              <a:rPr kumimoji="1" lang="en-US" altLang="zh-TW" dirty="0"/>
-              <a:t>keeps a reference to the other object—the </a:t>
-            </a:r>
-            <a:r>
-              <a:rPr kumimoji="1" lang="en-US" altLang="zh-TW" dirty="0">
-                <a:solidFill>
-                  <a:srgbClr val="FF0000"/>
-                </a:solidFill>
-              </a:rPr>
-              <a:t>delegate</a:t>
-            </a:r>
-            <a:r>
-              <a:rPr kumimoji="1" lang="en-US" altLang="zh-TW" dirty="0"/>
-              <a:t>—and at the appropriate time sends a message to it. </a:t>
-            </a:r>
-            <a:endParaRPr kumimoji="1" lang="en-US" altLang="zh-TW" dirty="0" smtClean="0"/>
-          </a:p>
-          <a:p>
-            <a:r>
-              <a:rPr kumimoji="1" lang="en-US" altLang="zh-TW" dirty="0"/>
-              <a:t>The </a:t>
-            </a:r>
-            <a:r>
-              <a:rPr kumimoji="1" lang="en-US" altLang="zh-TW" dirty="0">
-                <a:solidFill>
-                  <a:srgbClr val="3366FF"/>
-                </a:solidFill>
-              </a:rPr>
-              <a:t>delegating object </a:t>
-            </a:r>
-            <a:r>
-              <a:rPr kumimoji="1" lang="en-US" altLang="zh-TW" dirty="0"/>
-              <a:t>is typically a framework object, and the </a:t>
-            </a:r>
-            <a:r>
-              <a:rPr kumimoji="1" lang="en-US" altLang="zh-TW" dirty="0">
-                <a:solidFill>
-                  <a:srgbClr val="FF0000"/>
-                </a:solidFill>
-              </a:rPr>
-              <a:t>delegate</a:t>
-            </a:r>
-            <a:r>
-              <a:rPr kumimoji="1" lang="en-US" altLang="zh-TW" dirty="0"/>
-              <a:t> is typically a custom controller object. </a:t>
-            </a:r>
-          </a:p>
-          <a:p>
-            <a:r>
-              <a:rPr kumimoji="1" lang="en-US" altLang="zh-TW" dirty="0" smtClean="0"/>
-              <a:t>The </a:t>
-            </a:r>
-            <a:r>
-              <a:rPr kumimoji="1" lang="en-US" altLang="zh-TW" dirty="0"/>
-              <a:t>message informs the </a:t>
-            </a:r>
-            <a:r>
-              <a:rPr kumimoji="1" lang="en-US" altLang="zh-TW" dirty="0">
-                <a:solidFill>
-                  <a:srgbClr val="FF0000"/>
-                </a:solidFill>
-              </a:rPr>
-              <a:t>delegate</a:t>
-            </a:r>
-            <a:r>
-              <a:rPr kumimoji="1" lang="en-US" altLang="zh-TW" dirty="0"/>
-              <a:t> of an event that the </a:t>
-            </a:r>
-            <a:r>
-              <a:rPr kumimoji="1" lang="en-US" altLang="zh-TW" dirty="0" smtClean="0"/>
-              <a:t>“</a:t>
-            </a:r>
-            <a:r>
-              <a:rPr kumimoji="1" lang="en-US" altLang="zh-TW" dirty="0" smtClean="0">
-                <a:solidFill>
-                  <a:srgbClr val="3366FF"/>
-                </a:solidFill>
-              </a:rPr>
-              <a:t>delegating object</a:t>
-            </a:r>
-            <a:r>
-              <a:rPr kumimoji="1" lang="en-US" altLang="zh-TW" dirty="0" smtClean="0"/>
-              <a:t>” </a:t>
-            </a:r>
-            <a:r>
-              <a:rPr kumimoji="1" lang="en-US" altLang="zh-TW" dirty="0"/>
-              <a:t>is about to handle or has just handled. </a:t>
-            </a:r>
-            <a:endParaRPr kumimoji="1" lang="en-US" altLang="zh-TW" dirty="0" smtClean="0"/>
-          </a:p>
-          <a:p>
-            <a:r>
-              <a:rPr kumimoji="1" lang="en-US" altLang="zh-TW" dirty="0" smtClean="0"/>
-              <a:t>The </a:t>
-            </a:r>
-            <a:r>
-              <a:rPr kumimoji="1" lang="en-US" altLang="zh-TW" dirty="0">
-                <a:solidFill>
-                  <a:srgbClr val="FF0000"/>
-                </a:solidFill>
-              </a:rPr>
-              <a:t>delegate</a:t>
-            </a:r>
-            <a:r>
-              <a:rPr kumimoji="1" lang="en-US" altLang="zh-TW" dirty="0"/>
-              <a:t> may respond to the message by updating the </a:t>
-            </a:r>
-            <a:r>
-              <a:rPr kumimoji="1" lang="en-US" altLang="zh-TW" dirty="0" smtClean="0"/>
-              <a:t>appearance, </a:t>
-            </a:r>
-            <a:r>
-              <a:rPr kumimoji="1" lang="en-US" altLang="zh-TW" dirty="0"/>
-              <a:t>or state of </a:t>
-            </a:r>
-            <a:r>
-              <a:rPr kumimoji="1" lang="en-US" altLang="zh-TW" dirty="0" smtClean="0"/>
-              <a:t>itself, </a:t>
-            </a:r>
-            <a:r>
-              <a:rPr kumimoji="1" lang="en-US" altLang="zh-TW" dirty="0"/>
-              <a:t>or other objects in the application, and in some cases it can return a value that affects how an impending event is handled. </a:t>
-            </a:r>
-            <a:endParaRPr kumimoji="1" lang="en-US" altLang="zh-TW" dirty="0" smtClean="0"/>
-          </a:p>
-          <a:p>
-            <a:r>
-              <a:rPr kumimoji="1" lang="en-US" altLang="zh-TW" dirty="0" smtClean="0"/>
-              <a:t>The </a:t>
-            </a:r>
-            <a:r>
-              <a:rPr kumimoji="1" lang="en-US" altLang="zh-TW" dirty="0"/>
-              <a:t>main value of delegation is that it allows you to easily customize the behavior of several objects in one central object</a:t>
-            </a:r>
-            <a:r>
-              <a:rPr kumimoji="1" lang="en-US" altLang="zh-TW" dirty="0" smtClean="0"/>
-              <a:t>.</a:t>
-            </a:r>
-          </a:p>
-        </p:txBody>
-      </p:sp>
-    </p:spTree>
-    <p:extLst>
-      <p:ext uri="{BB962C8B-B14F-4D97-AF65-F5344CB8AC3E}">
-        <p14:creationId xmlns:p14="http://schemas.microsoft.com/office/powerpoint/2010/main" val="2607682321"/>
-      </p:ext>
-    </p:extLst>
-  </p:cSld>
-  <p:clrMapOvr>
-    <a:masterClrMapping/>
-  </p:clrMapOvr>
-  <p:timing>
-    <p:tnLst>
-      <p:par>
-        <p:cTn xmlns:p14="http://schemas.microsoft.com/office/powerpoint/2010/main" id="1" dur="indefinite" restart="never" nodeType="tmRoot"/>
-      </p:par>
-    </p:tnLst>
-  </p:timing>
-</p:sld>
-</file>
-
-<file path=ppt/slides/slide30.xml><?xml version="1.0" encoding="utf-8"?>
+<file path=ppt/slides/slide34.xml><?xml version="1.0" encoding="utf-8"?>
 <p:sld xmlns:a="http://schemas.openxmlformats.org/drawingml/2006/main" xmlns:r="http://schemas.openxmlformats.org/officeDocument/2006/relationships" xmlns:p="http://schemas.openxmlformats.org/presentationml/2006/main">
   <p:cSld>
     <p:spTree>
@@ -17267,7 +20546,7 @@
 </p:sld>
 </file>
 
-<file path=ppt/slides/slide31.xml><?xml version="1.0" encoding="utf-8"?>
+<file path=ppt/slides/slide35.xml><?xml version="1.0" encoding="utf-8"?>
 <p:sld xmlns:a="http://schemas.openxmlformats.org/drawingml/2006/main" xmlns:r="http://schemas.openxmlformats.org/officeDocument/2006/relationships" xmlns:p="http://schemas.openxmlformats.org/presentationml/2006/main">
   <p:cSld>
     <p:spTree>
@@ -17774,7 +21053,7 @@
 </p:sld>
 </file>
 
-<file path=ppt/slides/slide32.xml><?xml version="1.0" encoding="utf-8"?>
+<file path=ppt/slides/slide36.xml><?xml version="1.0" encoding="utf-8"?>
 <p:sld xmlns:a="http://schemas.openxmlformats.org/drawingml/2006/main" xmlns:r="http://schemas.openxmlformats.org/officeDocument/2006/relationships" xmlns:p="http://schemas.openxmlformats.org/presentationml/2006/main">
   <p:cSld>
     <p:spTree>
@@ -18690,7 +21969,7 @@
 </p:sld>
 </file>
 
-<file path=ppt/slides/slide33.xml><?xml version="1.0" encoding="utf-8"?>
+<file path=ppt/slides/slide37.xml><?xml version="1.0" encoding="utf-8"?>
 <p:sld xmlns:a="http://schemas.openxmlformats.org/drawingml/2006/main" xmlns:r="http://schemas.openxmlformats.org/officeDocument/2006/relationships" xmlns:p="http://schemas.openxmlformats.org/presentationml/2006/main">
   <p:cSld>
     <p:spTree>

</xml_diff>